<commit_message>
Update Program & Powerpoint
</commit_message>
<xml_diff>
--- a/00_Docs/Projektpraesentation.pptx
+++ b/00_Docs/Projektpraesentation.pptx
@@ -16553,7 +16553,7 @@
           <a:p>
             <a:fld id="{BCBBFA01-F023-4377-89AC-C163B9E7E6D1}" type="datetimeFigureOut">
               <a:rPr lang="de-AT" smtClean="0"/>
-              <a:t>25.03.2025</a:t>
+              <a:t>01.04.2025</a:t>
             </a:fld>
             <a:endParaRPr lang="de-AT"/>
           </a:p>
@@ -16970,7 +16970,7 @@
           <a:p>
             <a:fld id="{91D97426-86D1-4430-A049-06D8092E65E2}" type="datetime1">
               <a:rPr lang="de-AT" smtClean="0"/>
-              <a:t>25.03.2025</a:t>
+              <a:t>01.04.2025</a:t>
             </a:fld>
             <a:endParaRPr lang="de-AT"/>
           </a:p>
@@ -17170,7 +17170,7 @@
           <a:p>
             <a:fld id="{04009A1F-4CEB-4835-9A5C-2F9E019478A7}" type="datetime1">
               <a:rPr lang="de-AT" smtClean="0"/>
-              <a:t>25.03.2025</a:t>
+              <a:t>01.04.2025</a:t>
             </a:fld>
             <a:endParaRPr lang="de-AT"/>
           </a:p>
@@ -17380,7 +17380,7 @@
           <a:p>
             <a:fld id="{45E7D8FD-26F5-45BE-A321-F0FFCC7A3233}" type="datetime1">
               <a:rPr lang="de-AT" smtClean="0"/>
-              <a:t>25.03.2025</a:t>
+              <a:t>01.04.2025</a:t>
             </a:fld>
             <a:endParaRPr lang="de-AT"/>
           </a:p>
@@ -17580,7 +17580,7 @@
           <a:p>
             <a:fld id="{684D5CCA-44DE-413B-B5C1-1D136BF17977}" type="datetime1">
               <a:rPr lang="de-AT" smtClean="0"/>
-              <a:t>25.03.2025</a:t>
+              <a:t>01.04.2025</a:t>
             </a:fld>
             <a:endParaRPr lang="de-AT"/>
           </a:p>
@@ -17856,7 +17856,7 @@
           <a:p>
             <a:fld id="{0973C9B9-FBD9-40E9-9A50-344DDEEE4B2E}" type="datetime1">
               <a:rPr lang="de-AT" smtClean="0"/>
-              <a:t>25.03.2025</a:t>
+              <a:t>01.04.2025</a:t>
             </a:fld>
             <a:endParaRPr lang="de-AT"/>
           </a:p>
@@ -18124,7 +18124,7 @@
           <a:p>
             <a:fld id="{D28AC31D-080C-4A74-AF7A-6F3E55F236C4}" type="datetime1">
               <a:rPr lang="de-AT" smtClean="0"/>
-              <a:t>25.03.2025</a:t>
+              <a:t>01.04.2025</a:t>
             </a:fld>
             <a:endParaRPr lang="de-AT"/>
           </a:p>
@@ -18539,7 +18539,7 @@
           <a:p>
             <a:fld id="{1605DBBD-7D16-4D89-A115-B9FED4687354}" type="datetime1">
               <a:rPr lang="de-AT" smtClean="0"/>
-              <a:t>25.03.2025</a:t>
+              <a:t>01.04.2025</a:t>
             </a:fld>
             <a:endParaRPr lang="de-AT"/>
           </a:p>
@@ -18681,7 +18681,7 @@
           <a:p>
             <a:fld id="{0FA14D0E-A22E-4A65-8EA2-AFA19114667D}" type="datetime1">
               <a:rPr lang="de-AT" smtClean="0"/>
-              <a:t>25.03.2025</a:t>
+              <a:t>01.04.2025</a:t>
             </a:fld>
             <a:endParaRPr lang="de-AT"/>
           </a:p>
@@ -18794,7 +18794,7 @@
           <a:p>
             <a:fld id="{3E9C06AC-6CF7-457D-9838-1745E9877239}" type="datetime1">
               <a:rPr lang="de-AT" smtClean="0"/>
-              <a:t>25.03.2025</a:t>
+              <a:t>01.04.2025</a:t>
             </a:fld>
             <a:endParaRPr lang="de-AT"/>
           </a:p>
@@ -19107,7 +19107,7 @@
           <a:p>
             <a:fld id="{68CDD33F-05D0-4A49-AB44-CE36B5ED24A9}" type="datetime1">
               <a:rPr lang="de-AT" smtClean="0"/>
-              <a:t>25.03.2025</a:t>
+              <a:t>01.04.2025</a:t>
             </a:fld>
             <a:endParaRPr lang="de-AT"/>
           </a:p>
@@ -19396,7 +19396,7 @@
           <a:p>
             <a:fld id="{4728BC80-3BC6-453A-B3E1-783E722C379B}" type="datetime1">
               <a:rPr lang="de-AT" smtClean="0"/>
-              <a:t>25.03.2025</a:t>
+              <a:t>01.04.2025</a:t>
             </a:fld>
             <a:endParaRPr lang="de-AT"/>
           </a:p>
@@ -19639,7 +19639,7 @@
           <a:p>
             <a:fld id="{49D5023A-80B9-4C94-9892-5C3A77B19317}" type="datetime1">
               <a:rPr lang="de-AT" smtClean="0"/>
-              <a:t>25.03.2025</a:t>
+              <a:t>01.04.2025</a:t>
             </a:fld>
             <a:endParaRPr lang="de-AT"/>
           </a:p>
@@ -20136,10 +20136,20 @@
           <a:lstStyle/>
           <a:p>
             <a:r>
-              <a:rPr lang="de-AT"/>
-              <a:t>Java Vaadin</a:t>
+              <a:rPr lang="de-AT" dirty="0">
+                <a:latin typeface="Bahnschrift" panose="020B0502040204020203" pitchFamily="34" charset="0"/>
+              </a:rPr>
+              <a:t>Java </a:t>
             </a:r>
-            <a:endParaRPr lang="de-AT" dirty="0"/>
+            <a:r>
+              <a:rPr lang="de-AT" dirty="0" err="1">
+                <a:latin typeface="Bahnschrift" panose="020B0502040204020203" pitchFamily="34" charset="0"/>
+              </a:rPr>
+              <a:t>Vaadin</a:t>
+            </a:r>
+            <a:endParaRPr lang="de-AT" dirty="0">
+              <a:latin typeface="Bahnschrift" panose="020B0502040204020203" pitchFamily="34" charset="0"/>
+            </a:endParaRPr>
           </a:p>
         </p:txBody>
       </p:sp>
@@ -20165,10 +20175,20 @@
           <a:lstStyle/>
           <a:p>
             <a:r>
-              <a:rPr lang="de-AT"/>
-              <a:t>Jonas Aberger, Fabian Haslinger, Tim Hechenberger</a:t>
+              <a:rPr lang="de-AT" dirty="0">
+                <a:latin typeface="Bahnschrift" panose="020B0502040204020203" pitchFamily="34" charset="0"/>
+              </a:rPr>
+              <a:t>Jonas Aberger, Fabian Haslinger, Tim </a:t>
             </a:r>
-            <a:endParaRPr lang="de-AT" dirty="0"/>
+            <a:r>
+              <a:rPr lang="de-AT" dirty="0" err="1">
+                <a:latin typeface="Bahnschrift" panose="020B0502040204020203" pitchFamily="34" charset="0"/>
+              </a:rPr>
+              <a:t>Hechenberger</a:t>
+            </a:r>
+            <a:endParaRPr lang="de-AT" dirty="0">
+              <a:latin typeface="Bahnschrift" panose="020B0502040204020203" pitchFamily="34" charset="0"/>
+            </a:endParaRPr>
           </a:p>
         </p:txBody>
       </p:sp>
@@ -20195,7 +20215,7 @@
           <a:p>
             <a:fld id="{756D3C7B-BA68-4F0A-9E92-4F20FF1EF566}" type="datetime1">
               <a:rPr lang="de-AT" smtClean="0"/>
-              <a:t>25.03.2025</a:t>
+              <a:t>01.04.2025</a:t>
             </a:fld>
             <a:endParaRPr lang="de-AT"/>
           </a:p>
@@ -20240,13 +20260,13 @@
   <p:clrMapOvr>
     <a:masterClrMapping/>
   </p:clrMapOvr>
-  <mc:AlternateContent xmlns:mc="http://schemas.openxmlformats.org/markup-compatibility/2006">
-    <mc:Choice xmlns:p14="http://schemas.microsoft.com/office/powerpoint/2010/main" Requires="p14">
+  <mc:AlternateContent xmlns:mc="http://schemas.openxmlformats.org/markup-compatibility/2006" xmlns:p14="http://schemas.microsoft.com/office/powerpoint/2010/main">
+    <mc:Choice Requires="p14">
       <p:transition spd="slow" p14:dur="4400">
         <p14:honeycomb/>
       </p:transition>
     </mc:Choice>
-    <mc:Fallback>
+    <mc:Fallback xmlns="">
       <p:transition spd="slow">
         <p:fade/>
       </p:transition>
@@ -20295,7 +20315,7 @@
           <a:p>
             <a:fld id="{684D5CCA-44DE-413B-B5C1-1D136BF17977}" type="datetime1">
               <a:rPr lang="de-AT" smtClean="0"/>
-              <a:t>25.03.2025</a:t>
+              <a:t>01.04.2025</a:t>
             </a:fld>
             <a:endParaRPr lang="de-AT"/>
           </a:p>
@@ -20584,7 +20604,7 @@
           <a:p>
             <a:fld id="{684D5CCA-44DE-413B-B5C1-1D136BF17977}" type="datetime1">
               <a:rPr lang="de-AT" smtClean="0"/>
-              <a:t>25.03.2025</a:t>
+              <a:t>01.04.2025</a:t>
             </a:fld>
             <a:endParaRPr lang="de-AT"/>
           </a:p>
@@ -20919,7 +20939,7 @@
           <a:p>
             <a:fld id="{684D5CCA-44DE-413B-B5C1-1D136BF17977}" type="datetime1">
               <a:rPr lang="de-AT" smtClean="0"/>
-              <a:t>25.03.2025</a:t>
+              <a:t>01.04.2025</a:t>
             </a:fld>
             <a:endParaRPr lang="de-AT"/>
           </a:p>
@@ -21400,7 +21420,7 @@
           <a:p>
             <a:fld id="{684D5CCA-44DE-413B-B5C1-1D136BF17977}" type="datetime1">
               <a:rPr lang="de-AT" smtClean="0"/>
-              <a:t>25.03.2025</a:t>
+              <a:t>01.04.2025</a:t>
             </a:fld>
             <a:endParaRPr lang="de-AT"/>
           </a:p>
@@ -21873,13 +21893,13 @@
   <p:clrMapOvr>
     <a:masterClrMapping/>
   </p:clrMapOvr>
-  <mc:AlternateContent xmlns:mc="http://schemas.openxmlformats.org/markup-compatibility/2006">
-    <mc:Choice xmlns:p159="http://schemas.microsoft.com/office/powerpoint/2015/09/main" Requires="p159">
+  <mc:AlternateContent xmlns:mc="http://schemas.openxmlformats.org/markup-compatibility/2006" xmlns:p159="http://schemas.microsoft.com/office/powerpoint/2015/09/main">
+    <mc:Choice Requires="p159">
       <p:transition xmlns:p14="http://schemas.microsoft.com/office/powerpoint/2010/main" spd="slow" p14:dur="2000">
         <p159:morph option="byObject"/>
       </p:transition>
     </mc:Choice>
-    <mc:Fallback>
+    <mc:Fallback xmlns="">
       <p:transition spd="slow">
         <p:fade/>
       </p:transition>
@@ -22069,7 +22089,7 @@
           <a:p>
             <a:fld id="{684D5CCA-44DE-413B-B5C1-1D136BF17977}" type="datetime1">
               <a:rPr lang="de-AT" smtClean="0"/>
-              <a:t>25.03.2025</a:t>
+              <a:t>01.04.2025</a:t>
             </a:fld>
             <a:endParaRPr lang="de-AT"/>
           </a:p>
@@ -22542,13 +22562,13 @@
   <p:clrMapOvr>
     <a:masterClrMapping/>
   </p:clrMapOvr>
-  <mc:AlternateContent xmlns:mc="http://schemas.openxmlformats.org/markup-compatibility/2006">
-    <mc:Choice xmlns:p159="http://schemas.microsoft.com/office/powerpoint/2015/09/main" Requires="p159">
+  <mc:AlternateContent xmlns:mc="http://schemas.openxmlformats.org/markup-compatibility/2006" xmlns:p159="http://schemas.microsoft.com/office/powerpoint/2015/09/main">
+    <mc:Choice Requires="p159">
       <p:transition xmlns:p14="http://schemas.microsoft.com/office/powerpoint/2010/main" spd="slow" p14:dur="2000">
         <p159:morph option="byObject"/>
       </p:transition>
     </mc:Choice>
-    <mc:Fallback>
+    <mc:Fallback xmlns="">
       <p:transition spd="slow">
         <p:fade/>
       </p:transition>
@@ -22727,7 +22747,7 @@
           <a:p>
             <a:fld id="{684D5CCA-44DE-413B-B5C1-1D136BF17977}" type="datetime1">
               <a:rPr lang="de-AT" smtClean="0"/>
-              <a:t>25.03.2025</a:t>
+              <a:t>01.04.2025</a:t>
             </a:fld>
             <a:endParaRPr lang="de-AT"/>
           </a:p>
@@ -23048,13 +23068,13 @@
   <p:clrMapOvr>
     <a:masterClrMapping/>
   </p:clrMapOvr>
-  <mc:AlternateContent xmlns:mc="http://schemas.openxmlformats.org/markup-compatibility/2006">
-    <mc:Choice xmlns:p159="http://schemas.microsoft.com/office/powerpoint/2015/09/main" Requires="p159">
+  <mc:AlternateContent xmlns:mc="http://schemas.openxmlformats.org/markup-compatibility/2006" xmlns:p159="http://schemas.microsoft.com/office/powerpoint/2015/09/main">
+    <mc:Choice Requires="p159">
       <p:transition xmlns:p14="http://schemas.microsoft.com/office/powerpoint/2010/main" spd="slow" p14:dur="2000">
         <p159:morph option="byObject"/>
       </p:transition>
     </mc:Choice>
-    <mc:Fallback>
+    <mc:Fallback xmlns="">
       <p:transition spd="slow">
         <p:fade/>
       </p:transition>
@@ -23296,7 +23316,7 @@
           <a:p>
             <a:fld id="{684D5CCA-44DE-413B-B5C1-1D136BF17977}" type="datetime1">
               <a:rPr lang="de-AT" smtClean="0"/>
-              <a:t>25.03.2025</a:t>
+              <a:t>01.04.2025</a:t>
             </a:fld>
             <a:endParaRPr lang="de-AT"/>
           </a:p>
@@ -23636,7 +23656,7 @@
           <a:p>
             <a:fld id="{684D5CCA-44DE-413B-B5C1-1D136BF17977}" type="datetime1">
               <a:rPr lang="de-AT" smtClean="0"/>
-              <a:t>25.03.2025</a:t>
+              <a:t>01.04.2025</a:t>
             </a:fld>
             <a:endParaRPr lang="de-AT"/>
           </a:p>
@@ -23843,40 +23863,27 @@
             <p:ph type="title"/>
           </p:nvPr>
         </p:nvSpPr>
-        <p:spPr/>
+        <p:spPr>
+          <a:xfrm>
+            <a:off x="819150" y="3159760"/>
+            <a:ext cx="10515600" cy="2012315"/>
+          </a:xfrm>
+        </p:spPr>
         <p:txBody>
           <a:bodyPr/>
           <a:lstStyle/>
           <a:p>
             <a:r>
-              <a:rPr lang="de-AT" dirty="0"/>
-              <a:t>Demo Projekt : XXX</a:t>
+              <a:rPr lang="de-AT" b="1" dirty="0"/>
+              <a:t>Demo Projekt </a:t>
             </a:r>
-          </a:p>
-        </p:txBody>
-      </p:sp>
-      <p:sp>
-        <p:nvSpPr>
-          <p:cNvPr id="7" name="Textplatzhalter 6">
-            <a:extLst>
-              <a:ext uri="{FF2B5EF4-FFF2-40B4-BE49-F238E27FC236}">
-                <a16:creationId xmlns:a16="http://schemas.microsoft.com/office/drawing/2014/main" id="{D39AB5F8-E8B2-0EDC-CBD9-6D18DC33C0D2}"/>
-              </a:ext>
-            </a:extLst>
-          </p:cNvPr>
-          <p:cNvSpPr>
-            <a:spLocks noGrp="1"/>
-          </p:cNvSpPr>
-          <p:nvPr>
-            <p:ph type="body" idx="1"/>
-          </p:nvPr>
-        </p:nvSpPr>
-        <p:spPr/>
-        <p:txBody>
-          <a:bodyPr/>
-          <a:lstStyle/>
-          <a:p>
-            <a:endParaRPr lang="de-AT"/>
+            <a:br>
+              <a:rPr lang="de-AT" b="1" dirty="0"/>
+            </a:br>
+            <a:r>
+              <a:rPr lang="de-AT" b="1" dirty="0"/>
+              <a:t>ToDo-List &amp; Contact Manager</a:t>
+            </a:r>
           </a:p>
         </p:txBody>
       </p:sp>
@@ -23903,7 +23910,7 @@
           <a:p>
             <a:fld id="{684D5CCA-44DE-413B-B5C1-1D136BF17977}" type="datetime1">
               <a:rPr lang="de-AT" smtClean="0"/>
-              <a:t>25.03.2025</a:t>
+              <a:t>01.04.2025</a:t>
             </a:fld>
             <a:endParaRPr lang="de-AT"/>
           </a:p>
@@ -23938,6 +23945,100 @@
           </a:p>
         </p:txBody>
       </p:sp>
+      <p:pic>
+        <p:nvPicPr>
+          <p:cNvPr id="2056" name="Picture 8" descr="Contact Management Software | Try Freshsales for free">
+            <a:extLst>
+              <a:ext uri="{FF2B5EF4-FFF2-40B4-BE49-F238E27FC236}">
+                <a16:creationId xmlns:a16="http://schemas.microsoft.com/office/drawing/2014/main" id="{F1D99617-83C1-DBF2-2438-6C0A301277B9}"/>
+              </a:ext>
+            </a:extLst>
+          </p:cNvPr>
+          <p:cNvPicPr>
+            <a:picLocks noChangeAspect="1" noChangeArrowheads="1"/>
+          </p:cNvPicPr>
+          <p:nvPr/>
+        </p:nvPicPr>
+        <p:blipFill>
+          <a:blip r:embed="rId2">
+            <a:extLst>
+              <a:ext uri="{28A0092B-C50C-407E-A947-70E740481C1C}">
+                <a14:useLocalDpi xmlns:a14="http://schemas.microsoft.com/office/drawing/2010/main" val="0"/>
+              </a:ext>
+            </a:extLst>
+          </a:blip>
+          <a:srcRect/>
+          <a:stretch>
+            <a:fillRect/>
+          </a:stretch>
+        </p:blipFill>
+        <p:spPr bwMode="auto">
+          <a:xfrm>
+            <a:off x="7071442" y="1491218"/>
+            <a:ext cx="3980016" cy="2401444"/>
+          </a:xfrm>
+          <a:prstGeom prst="rect">
+            <a:avLst/>
+          </a:prstGeom>
+          <a:noFill/>
+          <a:extLst>
+            <a:ext uri="{909E8E84-426E-40DD-AFC4-6F175D3DCCD1}">
+              <a14:hiddenFill xmlns:a14="http://schemas.microsoft.com/office/drawing/2010/main">
+                <a:solidFill>
+                  <a:srgbClr val="FFFFFF"/>
+                </a:solidFill>
+              </a14:hiddenFill>
+            </a:ext>
+          </a:extLst>
+        </p:spPr>
+      </p:pic>
+      <p:pic>
+        <p:nvPicPr>
+          <p:cNvPr id="2058" name="Picture 10">
+            <a:extLst>
+              <a:ext uri="{FF2B5EF4-FFF2-40B4-BE49-F238E27FC236}">
+                <a16:creationId xmlns:a16="http://schemas.microsoft.com/office/drawing/2014/main" id="{48DF7975-5E01-7D62-E050-CC468E81A679}"/>
+              </a:ext>
+            </a:extLst>
+          </p:cNvPr>
+          <p:cNvPicPr>
+            <a:picLocks noChangeAspect="1" noChangeArrowheads="1"/>
+          </p:cNvPicPr>
+          <p:nvPr/>
+        </p:nvPicPr>
+        <p:blipFill>
+          <a:blip r:embed="rId3">
+            <a:extLst>
+              <a:ext uri="{28A0092B-C50C-407E-A947-70E740481C1C}">
+                <a14:useLocalDpi xmlns:a14="http://schemas.microsoft.com/office/drawing/2010/main" val="0"/>
+              </a:ext>
+            </a:extLst>
+          </a:blip>
+          <a:srcRect/>
+          <a:stretch>
+            <a:fillRect/>
+          </a:stretch>
+        </p:blipFill>
+        <p:spPr bwMode="auto">
+          <a:xfrm>
+            <a:off x="5565057" y="531967"/>
+            <a:ext cx="1730477" cy="2159973"/>
+          </a:xfrm>
+          <a:prstGeom prst="rect">
+            <a:avLst/>
+          </a:prstGeom>
+          <a:noFill/>
+          <a:extLst>
+            <a:ext uri="{909E8E84-426E-40DD-AFC4-6F175D3DCCD1}">
+              <a14:hiddenFill xmlns:a14="http://schemas.microsoft.com/office/drawing/2010/main">
+                <a:solidFill>
+                  <a:srgbClr val="FFFFFF"/>
+                </a:solidFill>
+              </a14:hiddenFill>
+            </a:ext>
+          </a:extLst>
+        </p:spPr>
+      </p:pic>
     </p:spTree>
     <p:extLst>
       <p:ext uri="{BB962C8B-B14F-4D97-AF65-F5344CB8AC3E}">
@@ -24028,15 +24129,96 @@
         </p:nvSpPr>
         <p:spPr>
           <a:xfrm>
-            <a:off x="838200" y="2491825"/>
+            <a:off x="825912" y="2278125"/>
             <a:ext cx="10515600" cy="3685138"/>
           </a:xfrm>
         </p:spPr>
         <p:txBody>
-          <a:bodyPr/>
+          <a:bodyPr>
+            <a:normAutofit/>
+          </a:bodyPr>
           <a:lstStyle/>
           <a:p>
+            <a:pPr marL="0" indent="0">
+              <a:buNone/>
+            </a:pPr>
+            <a:r>
+              <a:rPr lang="de-AT" b="1" dirty="0"/>
+              <a:t>Simple ToDo-Applikation</a:t>
+            </a:r>
+          </a:p>
+          <a:p>
+            <a:pPr lvl="1">
+              <a:buFont typeface="Symbol" panose="05050102010706020507" pitchFamily="18" charset="2"/>
+              <a:buChar char="-"/>
+            </a:pPr>
+            <a:r>
+              <a:rPr lang="de-AT" dirty="0"/>
+              <a:t>Grundlegende CRUD-Funktionalitäten</a:t>
+            </a:r>
+          </a:p>
+          <a:p>
+            <a:pPr lvl="1"/>
             <a:endParaRPr lang="de-AT" dirty="0"/>
+          </a:p>
+          <a:p>
+            <a:pPr marL="0" lvl="1" indent="0">
+              <a:spcBef>
+                <a:spcPts val="1000"/>
+              </a:spcBef>
+              <a:buNone/>
+            </a:pPr>
+            <a:r>
+              <a:rPr lang="de-AT" sz="2800" b="1" dirty="0"/>
+              <a:t>Contact-Manager</a:t>
+            </a:r>
+          </a:p>
+          <a:p>
+            <a:pPr marL="800100" lvl="2" indent="-342900">
+              <a:spcBef>
+                <a:spcPts val="1000"/>
+              </a:spcBef>
+              <a:buFont typeface="Symbol" panose="05050102010706020507" pitchFamily="18" charset="2"/>
+              <a:buChar char="-"/>
+            </a:pPr>
+            <a:r>
+              <a:rPr lang="de-AT" sz="2400" dirty="0"/>
+              <a:t>Erstellen von Benutzerkonten</a:t>
+            </a:r>
+          </a:p>
+          <a:p>
+            <a:pPr marL="800100" lvl="2" indent="-342900">
+              <a:spcBef>
+                <a:spcPts val="1000"/>
+              </a:spcBef>
+              <a:buFont typeface="Symbol" panose="05050102010706020507" pitchFamily="18" charset="2"/>
+              <a:buChar char="-"/>
+            </a:pPr>
+            <a:r>
+              <a:rPr lang="de-AT" sz="2400" dirty="0"/>
+              <a:t>Abrufen / Auswählen erstellter Nutzer</a:t>
+            </a:r>
+          </a:p>
+          <a:p>
+            <a:pPr marL="457200" lvl="2" indent="0">
+              <a:spcBef>
+                <a:spcPts val="1000"/>
+              </a:spcBef>
+              <a:buNone/>
+            </a:pPr>
+            <a:endParaRPr lang="de-AT" sz="2400" dirty="0"/>
+          </a:p>
+          <a:p>
+            <a:pPr marL="0" lvl="1" indent="0">
+              <a:spcBef>
+                <a:spcPts val="1000"/>
+              </a:spcBef>
+              <a:buNone/>
+            </a:pPr>
+            <a:r>
+              <a:rPr lang="de-AT" sz="2800" i="1" dirty="0"/>
+              <a:t>Konsistente Speicherung mithilfe einer PostgreSQL-DB</a:t>
+            </a:r>
           </a:p>
         </p:txBody>
       </p:sp>
@@ -24063,7 +24245,7 @@
           <a:p>
             <a:fld id="{684D5CCA-44DE-413B-B5C1-1D136BF17977}" type="datetime1">
               <a:rPr lang="de-AT" smtClean="0"/>
-              <a:t>25.03.2025</a:t>
+              <a:t>01.04.2025</a:t>
             </a:fld>
             <a:endParaRPr lang="de-AT"/>
           </a:p>
@@ -24128,7 +24310,7 @@
           <a:p>
             <a:r>
               <a:rPr lang="de-AT" dirty="0"/>
-              <a:t>Demoprojekt : XXX</a:t>
+              <a:t>Demoprojekt : ToDo-List &amp; Contact Manager</a:t>
             </a:r>
           </a:p>
         </p:txBody>
@@ -24181,6 +24363,18 @@
   <p:clrMapOvr>
     <a:masterClrMapping/>
   </p:clrMapOvr>
+  <mc:AlternateContent xmlns:mc="http://schemas.openxmlformats.org/markup-compatibility/2006">
+    <mc:Choice xmlns:p159="http://schemas.microsoft.com/office/powerpoint/2015/09/main" Requires="p159">
+      <p:transition xmlns:p14="http://schemas.microsoft.com/office/powerpoint/2010/main" spd="slow" p14:dur="2000">
+        <p159:morph option="byWord"/>
+      </p:transition>
+    </mc:Choice>
+    <mc:Fallback>
+      <p:transition spd="slow">
+        <p:fade/>
+      </p:transition>
+    </mc:Fallback>
+  </mc:AlternateContent>
 </p:sld>
 </file>
 
@@ -24295,41 +24489,41 @@
         <p:spPr/>
         <p:txBody>
           <a:bodyPr>
-            <a:normAutofit lnSpcReduction="10000"/>
+            <a:normAutofit/>
           </a:bodyPr>
           <a:lstStyle/>
           <a:p>
             <a:r>
-              <a:rPr lang="de-AT" dirty="0"/>
-              <a:t>Einleitung</a:t>
+              <a:rPr lang="de-AT" b="1" dirty="0"/>
+              <a:t>Allgemeines</a:t>
             </a:r>
           </a:p>
           <a:p>
-            <a:endParaRPr lang="de-AT" dirty="0"/>
+            <a:endParaRPr lang="de-AT" sz="500" b="1" dirty="0"/>
           </a:p>
           <a:p>
             <a:r>
-              <a:rPr lang="de-AT" dirty="0"/>
+              <a:rPr lang="de-AT" b="1" dirty="0"/>
               <a:t>Grundwissen &amp; Theorie</a:t>
             </a:r>
           </a:p>
           <a:p>
             <a:pPr lvl="1"/>
             <a:r>
-              <a:rPr lang="de-AT" dirty="0"/>
+              <a:rPr lang="de-AT" b="1" dirty="0"/>
               <a:t>Architekturüberblick</a:t>
             </a:r>
           </a:p>
           <a:p>
             <a:pPr lvl="1"/>
             <a:r>
-              <a:rPr lang="de-AT" dirty="0"/>
+              <a:rPr lang="de-AT" b="1" dirty="0"/>
               <a:t>Flow im Detail</a:t>
             </a:r>
           </a:p>
           <a:p>
             <a:pPr lvl="1"/>
-            <a:endParaRPr lang="de-AT" dirty="0"/>
+            <a:endParaRPr lang="de-AT" sz="500" b="1" dirty="0"/>
           </a:p>
           <a:p>
             <a:pPr marL="228600" lvl="1">
@@ -24338,7 +24532,7 @@
               </a:spcBef>
             </a:pPr>
             <a:r>
-              <a:rPr lang="de-AT" sz="2800" dirty="0"/>
+              <a:rPr lang="de-AT" sz="2800" b="1" dirty="0"/>
               <a:t>Demo-Projekt</a:t>
             </a:r>
           </a:p>
@@ -24349,7 +24543,7 @@
               </a:spcBef>
             </a:pPr>
             <a:r>
-              <a:rPr lang="de-AT" sz="2400" dirty="0"/>
+              <a:rPr lang="de-AT" sz="2400" b="1" dirty="0"/>
               <a:t>Einführung und Übersicht</a:t>
             </a:r>
           </a:p>
@@ -24360,9 +24554,17 @@
               </a:spcBef>
             </a:pPr>
             <a:r>
-              <a:rPr lang="de-AT" sz="2400" dirty="0"/>
+              <a:rPr lang="de-AT" sz="2400" b="1" dirty="0"/>
               <a:t>Live-Demo</a:t>
             </a:r>
+          </a:p>
+          <a:p>
+            <a:pPr marL="685800" lvl="2">
+              <a:spcBef>
+                <a:spcPts val="1000"/>
+              </a:spcBef>
+            </a:pPr>
+            <a:endParaRPr lang="de-AT" sz="500" b="1" dirty="0"/>
           </a:p>
           <a:p>
             <a:pPr marL="228600" lvl="1">
@@ -24371,7 +24573,7 @@
               </a:spcBef>
             </a:pPr>
             <a:r>
-              <a:rPr lang="de-AT" sz="2800" dirty="0"/>
+              <a:rPr lang="de-AT" sz="2800" b="1" dirty="0"/>
               <a:t>Quellen</a:t>
             </a:r>
           </a:p>
@@ -24400,7 +24602,7 @@
           <a:p>
             <a:fld id="{684D5CCA-44DE-413B-B5C1-1D136BF17977}" type="datetime1">
               <a:rPr lang="de-AT" smtClean="0"/>
-              <a:t>25.03.2025</a:t>
+              <a:t>01.04.2025</a:t>
             </a:fld>
             <a:endParaRPr lang="de-AT"/>
           </a:p>
@@ -24548,6 +24750,14 @@
 <file path=ppt/slides/slide20.xml><?xml version="1.0" encoding="utf-8"?>
 <p:sld xmlns:a="http://schemas.openxmlformats.org/drawingml/2006/main" xmlns:r="http://schemas.openxmlformats.org/officeDocument/2006/relationships" xmlns:p="http://schemas.openxmlformats.org/presentationml/2006/main">
   <p:cSld>
+    <p:bg>
+      <p:bgPr>
+        <a:solidFill>
+          <a:schemeClr val="bg1"/>
+        </a:solidFill>
+        <a:effectLst/>
+      </p:bgPr>
+    </p:bg>
     <p:spTree>
       <p:nvGrpSpPr>
         <p:cNvPr id="1" name=""/>
@@ -24562,6 +24772,281 @@
           <a:chExt cx="0" cy="0"/>
         </a:xfrm>
       </p:grpSpPr>
+      <p:sp useBgFill="1">
+        <p:nvSpPr>
+          <p:cNvPr id="11" name="Rectangle 10">
+            <a:extLst>
+              <a:ext uri="{FF2B5EF4-FFF2-40B4-BE49-F238E27FC236}">
+                <a16:creationId xmlns:a16="http://schemas.microsoft.com/office/drawing/2014/main" id="{9095C1F4-AE7F-44E4-8693-40D3D6831140}"/>
+              </a:ext>
+              <a:ext uri="{C183D7F6-B498-43B3-948B-1728B52AA6E4}">
+                <adec:decorative xmlns:adec="http://schemas.microsoft.com/office/drawing/2017/decorative" val="1"/>
+              </a:ext>
+            </a:extLst>
+          </p:cNvPr>
+          <p:cNvSpPr>
+            <a:spLocks noGrp="1" noRot="1" noChangeAspect="1" noMove="1" noResize="1" noEditPoints="1" noAdjustHandles="1" noChangeArrowheads="1" noChangeShapeType="1" noTextEdit="1"/>
+          </p:cNvSpPr>
+          <p:nvPr>
+            <p:extLst>
+              <p:ext uri="{386F3935-93C4-4BCD-93E2-E3B085C9AB24}">
+                <p16:designElem xmlns:p16="http://schemas.microsoft.com/office/powerpoint/2015/main" val="1"/>
+              </p:ext>
+            </p:extLst>
+          </p:nvPr>
+        </p:nvSpPr>
+        <p:spPr>
+          <a:xfrm>
+            <a:off x="0" y="0"/>
+            <a:ext cx="12191999" cy="6857365"/>
+          </a:xfrm>
+          <a:prstGeom prst="rect">
+            <a:avLst/>
+          </a:prstGeom>
+          <a:ln>
+            <a:noFill/>
+          </a:ln>
+        </p:spPr>
+        <p:style>
+          <a:lnRef idx="2">
+            <a:schemeClr val="accent1">
+              <a:shade val="50000"/>
+            </a:schemeClr>
+          </a:lnRef>
+          <a:fillRef idx="1">
+            <a:schemeClr val="accent1"/>
+          </a:fillRef>
+          <a:effectRef idx="0">
+            <a:schemeClr val="accent1"/>
+          </a:effectRef>
+          <a:fontRef idx="minor">
+            <a:schemeClr val="lt1"/>
+          </a:fontRef>
+        </p:style>
+        <p:txBody>
+          <a:bodyPr rtlCol="0" anchor="ctr"/>
+          <a:lstStyle/>
+          <a:p>
+            <a:pPr algn="ctr"/>
+            <a:endParaRPr lang="en-US"/>
+          </a:p>
+        </p:txBody>
+      </p:sp>
+      <p:grpSp>
+        <p:nvGrpSpPr>
+          <p:cNvPr id="13" name="Group 12">
+            <a:extLst>
+              <a:ext uri="{FF2B5EF4-FFF2-40B4-BE49-F238E27FC236}">
+                <a16:creationId xmlns:a16="http://schemas.microsoft.com/office/drawing/2014/main" id="{8734DDD3-F723-4DD3-8ABE-EC0B2AC87D74}"/>
+              </a:ext>
+              <a:ext uri="{C183D7F6-B498-43B3-948B-1728B52AA6E4}">
+                <adec:decorative xmlns:adec="http://schemas.microsoft.com/office/drawing/2017/decorative" val="1"/>
+              </a:ext>
+            </a:extLst>
+          </p:cNvPr>
+          <p:cNvGrpSpPr>
+            <a:grpSpLocks noGrp="1" noUngrp="1" noRot="1" noChangeAspect="1" noMove="1" noResize="1"/>
+          </p:cNvGrpSpPr>
+          <p:nvPr>
+            <p:extLst>
+              <p:ext uri="{386F3935-93C4-4BCD-93E2-E3B085C9AB24}">
+                <p16:designElem xmlns:p16="http://schemas.microsoft.com/office/powerpoint/2015/main" val="1"/>
+              </p:ext>
+            </p:extLst>
+          </p:nvPr>
+        </p:nvGrpSpPr>
+        <p:grpSpPr>
+          <a:xfrm>
+            <a:off x="2522324" y="-15978"/>
+            <a:ext cx="7147352" cy="5876916"/>
+            <a:chOff x="329184" y="-99107"/>
+            <a:chExt cx="524256" cy="5876916"/>
+          </a:xfrm>
+        </p:grpSpPr>
+        <p:cxnSp>
+          <p:nvCxnSpPr>
+            <p:cNvPr id="14" name="Straight Connector 13">
+              <a:extLst>
+                <a:ext uri="{FF2B5EF4-FFF2-40B4-BE49-F238E27FC236}">
+                  <a16:creationId xmlns:a16="http://schemas.microsoft.com/office/drawing/2014/main" id="{F7C8EA93-3210-4C62-99E9-153C275E3A87}"/>
+                </a:ext>
+                <a:ext uri="{C183D7F6-B498-43B3-948B-1728B52AA6E4}">
+                  <adec:decorative xmlns:adec="http://schemas.microsoft.com/office/drawing/2017/decorative" val="1"/>
+                </a:ext>
+              </a:extLst>
+            </p:cNvPr>
+            <p:cNvCxnSpPr>
+              <a:cxnSpLocks/>
+            </p:cNvCxnSpPr>
+            <p:nvPr>
+              <p:extLst>
+                <p:ext uri="{386F3935-93C4-4BCD-93E2-E3B085C9AB24}">
+                  <p16:designElem xmlns:p16="http://schemas.microsoft.com/office/powerpoint/2015/main" val="1"/>
+                </p:ext>
+              </p:extLst>
+            </p:nvPr>
+          </p:nvCxnSpPr>
+          <p:spPr>
+            <a:xfrm flipH="1">
+              <a:off x="329184" y="5777809"/>
+              <a:ext cx="523824" cy="0"/>
+            </a:xfrm>
+            <a:prstGeom prst="line">
+              <a:avLst/>
+            </a:prstGeom>
+            <a:ln w="152400">
+              <a:solidFill>
+                <a:schemeClr val="accent4"/>
+              </a:solidFill>
+            </a:ln>
+          </p:spPr>
+          <p:style>
+            <a:lnRef idx="1">
+              <a:schemeClr val="accent1"/>
+            </a:lnRef>
+            <a:fillRef idx="0">
+              <a:schemeClr val="accent1"/>
+            </a:fillRef>
+            <a:effectRef idx="0">
+              <a:schemeClr val="accent1"/>
+            </a:effectRef>
+            <a:fontRef idx="minor">
+              <a:schemeClr val="tx1"/>
+            </a:fontRef>
+          </p:style>
+        </p:cxnSp>
+        <p:sp>
+          <p:nvSpPr>
+            <p:cNvPr id="15" name="Rectangle 14">
+              <a:extLst>
+                <a:ext uri="{FF2B5EF4-FFF2-40B4-BE49-F238E27FC236}">
+                  <a16:creationId xmlns:a16="http://schemas.microsoft.com/office/drawing/2014/main" id="{5EB7D2A2-F448-44D4-938C-DC84CBCB3B1E}"/>
+                </a:ext>
+                <a:ext uri="{C183D7F6-B498-43B3-948B-1728B52AA6E4}">
+                  <adec:decorative xmlns:adec="http://schemas.microsoft.com/office/drawing/2017/decorative" val="1"/>
+                </a:ext>
+              </a:extLst>
+            </p:cNvPr>
+            <p:cNvSpPr/>
+            <p:nvPr>
+              <p:extLst>
+                <p:ext uri="{386F3935-93C4-4BCD-93E2-E3B085C9AB24}">
+                  <p16:designElem xmlns:p16="http://schemas.microsoft.com/office/powerpoint/2015/main" val="1"/>
+                </p:ext>
+              </p:extLst>
+            </p:nvPr>
+          </p:nvSpPr>
+          <p:spPr>
+            <a:xfrm>
+              <a:off x="329184" y="-99107"/>
+              <a:ext cx="524256" cy="5631228"/>
+            </a:xfrm>
+            <a:prstGeom prst="rect">
+              <a:avLst/>
+            </a:prstGeom>
+            <a:solidFill>
+              <a:schemeClr val="accent4"/>
+            </a:solidFill>
+            <a:ln>
+              <a:noFill/>
+            </a:ln>
+          </p:spPr>
+          <p:style>
+            <a:lnRef idx="2">
+              <a:schemeClr val="accent1">
+                <a:shade val="50000"/>
+              </a:schemeClr>
+            </a:lnRef>
+            <a:fillRef idx="1">
+              <a:schemeClr val="accent1"/>
+            </a:fillRef>
+            <a:effectRef idx="0">
+              <a:schemeClr val="accent1"/>
+            </a:effectRef>
+            <a:fontRef idx="minor">
+              <a:schemeClr val="lt1"/>
+            </a:fontRef>
+          </p:style>
+          <p:txBody>
+            <a:bodyPr rtlCol="0" anchor="ctr"/>
+            <a:lstStyle/>
+            <a:p>
+              <a:pPr algn="ctr"/>
+              <a:endParaRPr lang="en-US" dirty="0"/>
+            </a:p>
+          </p:txBody>
+        </p:sp>
+      </p:grpSp>
+      <p:sp>
+        <p:nvSpPr>
+          <p:cNvPr id="17" name="Rectangle 16">
+            <a:extLst>
+              <a:ext uri="{FF2B5EF4-FFF2-40B4-BE49-F238E27FC236}">
+                <a16:creationId xmlns:a16="http://schemas.microsoft.com/office/drawing/2014/main" id="{871AEA07-1E14-44B4-8E55-64EF049CD66F}"/>
+              </a:ext>
+              <a:ext uri="{C183D7F6-B498-43B3-948B-1728B52AA6E4}">
+                <adec:decorative xmlns:adec="http://schemas.microsoft.com/office/drawing/2017/decorative" val="1"/>
+              </a:ext>
+            </a:extLst>
+          </p:cNvPr>
+          <p:cNvSpPr>
+            <a:spLocks noGrp="1" noRot="1" noChangeAspect="1" noMove="1" noResize="1" noEditPoints="1" noAdjustHandles="1" noChangeArrowheads="1" noChangeShapeType="1" noTextEdit="1"/>
+          </p:cNvSpPr>
+          <p:nvPr>
+            <p:extLst>
+              <p:ext uri="{386F3935-93C4-4BCD-93E2-E3B085C9AB24}">
+                <p16:designElem xmlns:p16="http://schemas.microsoft.com/office/powerpoint/2015/main" val="1"/>
+              </p:ext>
+            </p:extLst>
+          </p:nvPr>
+        </p:nvSpPr>
+        <p:spPr>
+          <a:xfrm>
+            <a:off x="596464" y="1055718"/>
+            <a:ext cx="10999072" cy="3358344"/>
+          </a:xfrm>
+          <a:prstGeom prst="rect">
+            <a:avLst/>
+          </a:prstGeom>
+          <a:solidFill>
+            <a:schemeClr val="bg1"/>
+          </a:solidFill>
+          <a:ln>
+            <a:noFill/>
+          </a:ln>
+          <a:effectLst>
+            <a:outerShdw blurRad="139700" dist="127000" dir="5400000" algn="t" rotWithShape="0">
+              <a:prstClr val="black">
+                <a:alpha val="15000"/>
+              </a:prstClr>
+            </a:outerShdw>
+          </a:effectLst>
+        </p:spPr>
+        <p:style>
+          <a:lnRef idx="2">
+            <a:schemeClr val="accent1">
+              <a:shade val="50000"/>
+            </a:schemeClr>
+          </a:lnRef>
+          <a:fillRef idx="1">
+            <a:schemeClr val="accent1"/>
+          </a:fillRef>
+          <a:effectRef idx="0">
+            <a:schemeClr val="accent1"/>
+          </a:effectRef>
+          <a:fontRef idx="minor">
+            <a:schemeClr val="lt1"/>
+          </a:fontRef>
+        </p:style>
+        <p:txBody>
+          <a:bodyPr rtlCol="0" anchor="ctr"/>
+          <a:lstStyle/>
+          <a:p>
+            <a:pPr algn="ctr"/>
+            <a:endParaRPr lang="en-US"/>
+          </a:p>
+        </p:txBody>
+      </p:sp>
       <p:sp>
         <p:nvSpPr>
           <p:cNvPr id="6" name="Titel 5">
@@ -24578,40 +25063,33 @@
             <p:ph type="ctrTitle"/>
           </p:nvPr>
         </p:nvSpPr>
-        <p:spPr/>
+        <p:spPr>
+          <a:xfrm>
+            <a:off x="1524000" y="1584683"/>
+            <a:ext cx="9144000" cy="2551829"/>
+          </a:xfrm>
+        </p:spPr>
         <p:txBody>
-          <a:bodyPr/>
+          <a:bodyPr anchor="ctr">
+            <a:normAutofit/>
+          </a:bodyPr>
           <a:lstStyle/>
           <a:p>
             <a:r>
-              <a:rPr lang="de-AT" dirty="0"/>
-              <a:t>Demoprojekt Live-Demo</a:t>
+              <a:rPr lang="de-AT" sz="5600" dirty="0"/>
+              <a:t>Demoprojekt-</a:t>
             </a:r>
-          </a:p>
-        </p:txBody>
-      </p:sp>
-      <p:sp>
-        <p:nvSpPr>
-          <p:cNvPr id="7" name="Untertitel 6">
-            <a:extLst>
-              <a:ext uri="{FF2B5EF4-FFF2-40B4-BE49-F238E27FC236}">
-                <a16:creationId xmlns:a16="http://schemas.microsoft.com/office/drawing/2014/main" id="{AA43E23D-28AC-2C57-4E85-CD45C0AF7640}"/>
-              </a:ext>
-            </a:extLst>
-          </p:cNvPr>
-          <p:cNvSpPr>
-            <a:spLocks noGrp="1"/>
-          </p:cNvSpPr>
-          <p:nvPr>
-            <p:ph type="subTitle" idx="1"/>
-          </p:nvPr>
-        </p:nvSpPr>
-        <p:spPr/>
-        <p:txBody>
-          <a:bodyPr/>
-          <a:lstStyle/>
-          <a:p>
-            <a:endParaRPr lang="de-AT"/>
+            <a:r>
+              <a:rPr lang="de-AT" sz="5600" dirty="0" err="1"/>
+              <a:t>LiveDemo</a:t>
+            </a:r>
+            <a:br>
+              <a:rPr lang="de-AT" sz="5600" dirty="0"/>
+            </a:br>
+            <a:r>
+              <a:rPr lang="de-AT" sz="5600" dirty="0"/>
+              <a:t>ToDo-List &amp; Contact Manager</a:t>
+            </a:r>
           </a:p>
         </p:txBody>
       </p:sp>
@@ -24631,14 +25109,31 @@
             <p:ph type="dt" sz="half" idx="10"/>
           </p:nvPr>
         </p:nvSpPr>
-        <p:spPr/>
+        <p:spPr>
+          <a:xfrm>
+            <a:off x="838200" y="6492240"/>
+            <a:ext cx="2743200" cy="365125"/>
+          </a:xfrm>
+        </p:spPr>
         <p:txBody>
-          <a:bodyPr/>
+          <a:bodyPr>
+            <a:normAutofit/>
+          </a:bodyPr>
           <a:lstStyle/>
           <a:p>
+            <a:pPr>
+              <a:spcAft>
+                <a:spcPts val="600"/>
+              </a:spcAft>
+            </a:pPr>
             <a:fld id="{684D5CCA-44DE-413B-B5C1-1D136BF17977}" type="datetime1">
               <a:rPr lang="de-AT" smtClean="0"/>
-              <a:t>25.03.2025</a:t>
+              <a:pPr>
+                <a:spcAft>
+                  <a:spcPts val="600"/>
+                </a:spcAft>
+              </a:pPr>
+              <a:t>01.04.2025</a:t>
             </a:fld>
             <a:endParaRPr lang="de-AT"/>
           </a:p>
@@ -24660,13 +25155,30 @@
             <p:ph type="sldNum" sz="quarter" idx="12"/>
           </p:nvPr>
         </p:nvSpPr>
-        <p:spPr/>
+        <p:spPr>
+          <a:xfrm>
+            <a:off x="8610600" y="6492240"/>
+            <a:ext cx="2743200" cy="365125"/>
+          </a:xfrm>
+        </p:spPr>
         <p:txBody>
-          <a:bodyPr/>
+          <a:bodyPr>
+            <a:normAutofit/>
+          </a:bodyPr>
           <a:lstStyle/>
           <a:p>
+            <a:pPr>
+              <a:spcAft>
+                <a:spcPts val="600"/>
+              </a:spcAft>
+            </a:pPr>
             <a:fld id="{45EFCB84-3E55-4BB4-B142-FD608455239A}" type="slidenum">
               <a:rPr lang="de-AT" smtClean="0"/>
+              <a:pPr>
+                <a:spcAft>
+                  <a:spcPts val="600"/>
+                </a:spcAft>
+              </a:pPr>
               <a:t>20</a:t>
             </a:fld>
             <a:endParaRPr lang="de-AT"/>
@@ -24683,12 +25195,23 @@
   <p:clrMapOvr>
     <a:masterClrMapping/>
   </p:clrMapOvr>
+  <p:transition spd="slow">
+    <p:push dir="u"/>
+  </p:transition>
 </p:sld>
 </file>
 
 <file path=ppt/slides/slide21.xml><?xml version="1.0" encoding="utf-8"?>
 <p:sld xmlns:a="http://schemas.openxmlformats.org/drawingml/2006/main" xmlns:r="http://schemas.openxmlformats.org/officeDocument/2006/relationships" xmlns:p="http://schemas.openxmlformats.org/presentationml/2006/main">
   <p:cSld>
+    <p:bg>
+      <p:bgPr>
+        <a:solidFill>
+          <a:schemeClr val="bg1"/>
+        </a:solidFill>
+        <a:effectLst/>
+      </p:bgPr>
+    </p:bg>
     <p:spTree>
       <p:nvGrpSpPr>
         <p:cNvPr id="1" name=""/>
@@ -24703,6 +25226,66 @@
           <a:chExt cx="0" cy="0"/>
         </a:xfrm>
       </p:grpSpPr>
+      <p:sp useBgFill="1">
+        <p:nvSpPr>
+          <p:cNvPr id="1033" name="Rectangle 1032">
+            <a:extLst>
+              <a:ext uri="{FF2B5EF4-FFF2-40B4-BE49-F238E27FC236}">
+                <a16:creationId xmlns:a16="http://schemas.microsoft.com/office/drawing/2014/main" id="{47942995-B07F-4636-9A06-C6A104B260A8}"/>
+              </a:ext>
+              <a:ext uri="{C183D7F6-B498-43B3-948B-1728B52AA6E4}">
+                <adec:decorative xmlns:adec="http://schemas.microsoft.com/office/drawing/2017/decorative" val="1"/>
+              </a:ext>
+            </a:extLst>
+          </p:cNvPr>
+          <p:cNvSpPr>
+            <a:spLocks noGrp="1" noRot="1" noChangeAspect="1" noMove="1" noResize="1" noEditPoints="1" noAdjustHandles="1" noChangeArrowheads="1" noChangeShapeType="1" noTextEdit="1"/>
+          </p:cNvSpPr>
+          <p:nvPr>
+            <p:extLst>
+              <p:ext uri="{386F3935-93C4-4BCD-93E2-E3B085C9AB24}">
+                <p16:designElem xmlns:p16="http://schemas.microsoft.com/office/powerpoint/2015/main" val="1"/>
+              </p:ext>
+            </p:extLst>
+          </p:nvPr>
+        </p:nvSpPr>
+        <p:spPr>
+          <a:xfrm>
+            <a:off x="0" y="0"/>
+            <a:ext cx="12191999" cy="6857365"/>
+          </a:xfrm>
+          <a:prstGeom prst="rect">
+            <a:avLst/>
+          </a:prstGeom>
+          <a:ln>
+            <a:noFill/>
+          </a:ln>
+        </p:spPr>
+        <p:style>
+          <a:lnRef idx="2">
+            <a:schemeClr val="accent1">
+              <a:shade val="50000"/>
+            </a:schemeClr>
+          </a:lnRef>
+          <a:fillRef idx="1">
+            <a:schemeClr val="accent1"/>
+          </a:fillRef>
+          <a:effectRef idx="0">
+            <a:schemeClr val="accent1"/>
+          </a:effectRef>
+          <a:fontRef idx="minor">
+            <a:schemeClr val="lt1"/>
+          </a:fontRef>
+        </p:style>
+        <p:txBody>
+          <a:bodyPr rtlCol="0" anchor="ctr"/>
+          <a:lstStyle/>
+          <a:p>
+            <a:pPr algn="ctr"/>
+            <a:endParaRPr lang="en-US"/>
+          </a:p>
+        </p:txBody>
+      </p:sp>
       <p:sp>
         <p:nvSpPr>
           <p:cNvPr id="6" name="Titel 5">
@@ -24721,21 +25304,442 @@
         </p:nvSpPr>
         <p:spPr>
           <a:xfrm>
-            <a:off x="831850" y="1709738"/>
-            <a:ext cx="10872470" cy="2852737"/>
+            <a:off x="865438" y="2327000"/>
+            <a:ext cx="4418623" cy="2387600"/>
           </a:xfrm>
         </p:spPr>
         <p:txBody>
-          <a:bodyPr/>
+          <a:bodyPr vert="horz" lIns="91440" tIns="45720" rIns="91440" bIns="45720" rtlCol="0" anchor="t">
+            <a:normAutofit/>
+          </a:bodyPr>
           <a:lstStyle/>
           <a:p>
             <a:r>
-              <a:rPr lang="de-AT" dirty="0"/>
-              <a:t>Vielen Danke für Eure Aufmerksamkeit!</a:t>
+              <a:rPr lang="en-US" sz="4800" kern="1200" dirty="0">
+                <a:solidFill>
+                  <a:schemeClr val="tx1"/>
+                </a:solidFill>
+                <a:latin typeface="+mj-lt"/>
+                <a:ea typeface="+mj-ea"/>
+                <a:cs typeface="+mj-cs"/>
+              </a:rPr>
+              <a:t>Vielen Dank</a:t>
+            </a:r>
+            <a:br>
+              <a:rPr lang="en-US" sz="4800" kern="1200" dirty="0">
+                <a:solidFill>
+                  <a:schemeClr val="tx1"/>
+                </a:solidFill>
+                <a:latin typeface="+mj-lt"/>
+                <a:ea typeface="+mj-ea"/>
+                <a:cs typeface="+mj-cs"/>
+              </a:rPr>
+            </a:br>
+            <a:r>
+              <a:rPr lang="en-US" sz="4800" kern="1200" dirty="0">
+                <a:solidFill>
+                  <a:schemeClr val="tx1"/>
+                </a:solidFill>
+                <a:latin typeface="+mj-lt"/>
+                <a:ea typeface="+mj-ea"/>
+                <a:cs typeface="+mj-cs"/>
+              </a:rPr>
+              <a:t>für Eure Aufmerksamkeit!</a:t>
             </a:r>
           </a:p>
         </p:txBody>
       </p:sp>
+      <p:grpSp>
+        <p:nvGrpSpPr>
+          <p:cNvPr id="1035" name="Group 1034">
+            <a:extLst>
+              <a:ext uri="{FF2B5EF4-FFF2-40B4-BE49-F238E27FC236}">
+                <a16:creationId xmlns:a16="http://schemas.microsoft.com/office/drawing/2014/main" id="{032D8612-31EB-44CF-A1D0-14FD4C705424}"/>
+              </a:ext>
+              <a:ext uri="{C183D7F6-B498-43B3-948B-1728B52AA6E4}">
+                <adec:decorative xmlns:adec="http://schemas.microsoft.com/office/drawing/2017/decorative" val="1"/>
+              </a:ext>
+            </a:extLst>
+          </p:cNvPr>
+          <p:cNvGrpSpPr>
+            <a:grpSpLocks noGrp="1" noUngrp="1" noRot="1" noChangeAspect="1" noMove="1" noResize="1"/>
+          </p:cNvGrpSpPr>
+          <p:nvPr>
+            <p:extLst>
+              <p:ext uri="{386F3935-93C4-4BCD-93E2-E3B085C9AB24}">
+                <p16:designElem xmlns:p16="http://schemas.microsoft.com/office/powerpoint/2015/main" val="1"/>
+              </p:ext>
+            </p:extLst>
+          </p:nvPr>
+        </p:nvGrpSpPr>
+        <p:grpSpPr>
+          <a:xfrm>
+            <a:off x="0" y="2984992"/>
+            <a:ext cx="731521" cy="673460"/>
+            <a:chOff x="3940602" y="308034"/>
+            <a:chExt cx="2116791" cy="3428999"/>
+          </a:xfrm>
+          <a:solidFill>
+            <a:schemeClr val="accent4"/>
+          </a:solidFill>
+        </p:grpSpPr>
+        <p:sp>
+          <p:nvSpPr>
+            <p:cNvPr id="1036" name="Rectangle 1035">
+              <a:extLst>
+                <a:ext uri="{FF2B5EF4-FFF2-40B4-BE49-F238E27FC236}">
+                  <a16:creationId xmlns:a16="http://schemas.microsoft.com/office/drawing/2014/main" id="{F19A4A0F-1B59-4DB0-9764-D10936E98770}"/>
+                </a:ext>
+                <a:ext uri="{C183D7F6-B498-43B3-948B-1728B52AA6E4}">
+                  <adec:decorative xmlns:adec="http://schemas.microsoft.com/office/drawing/2017/decorative" val="1"/>
+                </a:ext>
+              </a:extLst>
+            </p:cNvPr>
+            <p:cNvSpPr/>
+            <p:nvPr>
+              <p:extLst>
+                <p:ext uri="{386F3935-93C4-4BCD-93E2-E3B085C9AB24}">
+                  <p16:designElem xmlns:p16="http://schemas.microsoft.com/office/powerpoint/2015/main" val="1"/>
+                </p:ext>
+              </p:extLst>
+            </p:nvPr>
+          </p:nvSpPr>
+          <p:spPr>
+            <a:xfrm>
+              <a:off x="3940602" y="308034"/>
+              <a:ext cx="566743" cy="3428999"/>
+            </a:xfrm>
+            <a:prstGeom prst="rect">
+              <a:avLst/>
+            </a:prstGeom>
+            <a:grpFill/>
+            <a:ln>
+              <a:noFill/>
+            </a:ln>
+          </p:spPr>
+          <p:style>
+            <a:lnRef idx="2">
+              <a:schemeClr val="accent1">
+                <a:shade val="50000"/>
+              </a:schemeClr>
+            </a:lnRef>
+            <a:fillRef idx="1">
+              <a:schemeClr val="accent1"/>
+            </a:fillRef>
+            <a:effectRef idx="0">
+              <a:schemeClr val="accent1"/>
+            </a:effectRef>
+            <a:fontRef idx="minor">
+              <a:schemeClr val="lt1"/>
+            </a:fontRef>
+          </p:style>
+          <p:txBody>
+            <a:bodyPr rtlCol="0" anchor="ctr"/>
+            <a:lstStyle/>
+            <a:p>
+              <a:pPr algn="ctr"/>
+              <a:endParaRPr lang="en-US"/>
+            </a:p>
+          </p:txBody>
+        </p:sp>
+        <p:sp>
+          <p:nvSpPr>
+            <p:cNvPr id="1037" name="Rectangle 1036">
+              <a:extLst>
+                <a:ext uri="{FF2B5EF4-FFF2-40B4-BE49-F238E27FC236}">
+                  <a16:creationId xmlns:a16="http://schemas.microsoft.com/office/drawing/2014/main" id="{F399A70F-F8CD-4992-9EF5-6CF15472E73F}"/>
+                </a:ext>
+                <a:ext uri="{C183D7F6-B498-43B3-948B-1728B52AA6E4}">
+                  <adec:decorative xmlns:adec="http://schemas.microsoft.com/office/drawing/2017/decorative" val="1"/>
+                </a:ext>
+              </a:extLst>
+            </p:cNvPr>
+            <p:cNvSpPr/>
+            <p:nvPr>
+              <p:extLst>
+                <p:ext uri="{386F3935-93C4-4BCD-93E2-E3B085C9AB24}">
+                  <p16:designElem xmlns:p16="http://schemas.microsoft.com/office/powerpoint/2015/main" val="1"/>
+                </p:ext>
+              </p:extLst>
+            </p:nvPr>
+          </p:nvSpPr>
+          <p:spPr>
+            <a:xfrm>
+              <a:off x="4715626" y="308034"/>
+              <a:ext cx="566743" cy="3428999"/>
+            </a:xfrm>
+            <a:prstGeom prst="rect">
+              <a:avLst/>
+            </a:prstGeom>
+            <a:grpFill/>
+            <a:ln>
+              <a:noFill/>
+            </a:ln>
+          </p:spPr>
+          <p:style>
+            <a:lnRef idx="2">
+              <a:schemeClr val="accent1">
+                <a:shade val="50000"/>
+              </a:schemeClr>
+            </a:lnRef>
+            <a:fillRef idx="1">
+              <a:schemeClr val="accent1"/>
+            </a:fillRef>
+            <a:effectRef idx="0">
+              <a:schemeClr val="accent1"/>
+            </a:effectRef>
+            <a:fontRef idx="minor">
+              <a:schemeClr val="lt1"/>
+            </a:fontRef>
+          </p:style>
+          <p:txBody>
+            <a:bodyPr rtlCol="0" anchor="ctr"/>
+            <a:lstStyle/>
+            <a:p>
+              <a:pPr algn="ctr"/>
+              <a:endParaRPr lang="en-US"/>
+            </a:p>
+          </p:txBody>
+        </p:sp>
+        <p:sp>
+          <p:nvSpPr>
+            <p:cNvPr id="1038" name="Rectangle 1037">
+              <a:extLst>
+                <a:ext uri="{FF2B5EF4-FFF2-40B4-BE49-F238E27FC236}">
+                  <a16:creationId xmlns:a16="http://schemas.microsoft.com/office/drawing/2014/main" id="{48F4FEDC-6D80-458C-A665-075D9B9500FD}"/>
+                </a:ext>
+                <a:ext uri="{C183D7F6-B498-43B3-948B-1728B52AA6E4}">
+                  <adec:decorative xmlns:adec="http://schemas.microsoft.com/office/drawing/2017/decorative" val="1"/>
+                </a:ext>
+              </a:extLst>
+            </p:cNvPr>
+            <p:cNvSpPr/>
+            <p:nvPr>
+              <p:extLst>
+                <p:ext uri="{386F3935-93C4-4BCD-93E2-E3B085C9AB24}">
+                  <p16:designElem xmlns:p16="http://schemas.microsoft.com/office/powerpoint/2015/main" val="1"/>
+                </p:ext>
+              </p:extLst>
+            </p:nvPr>
+          </p:nvSpPr>
+          <p:spPr>
+            <a:xfrm>
+              <a:off x="5490650" y="308034"/>
+              <a:ext cx="566743" cy="3428999"/>
+            </a:xfrm>
+            <a:prstGeom prst="rect">
+              <a:avLst/>
+            </a:prstGeom>
+            <a:grpFill/>
+            <a:ln>
+              <a:noFill/>
+            </a:ln>
+          </p:spPr>
+          <p:style>
+            <a:lnRef idx="2">
+              <a:schemeClr val="accent1">
+                <a:shade val="50000"/>
+              </a:schemeClr>
+            </a:lnRef>
+            <a:fillRef idx="1">
+              <a:schemeClr val="accent1"/>
+            </a:fillRef>
+            <a:effectRef idx="0">
+              <a:schemeClr val="accent1"/>
+            </a:effectRef>
+            <a:fontRef idx="minor">
+              <a:schemeClr val="lt1"/>
+            </a:fontRef>
+          </p:style>
+          <p:txBody>
+            <a:bodyPr rtlCol="0" anchor="ctr"/>
+            <a:lstStyle/>
+            <a:p>
+              <a:pPr algn="ctr"/>
+              <a:endParaRPr lang="en-US"/>
+            </a:p>
+          </p:txBody>
+        </p:sp>
+      </p:grpSp>
+      <p:sp>
+        <p:nvSpPr>
+          <p:cNvPr id="1040" name="Rectangle 1039">
+            <a:extLst>
+              <a:ext uri="{FF2B5EF4-FFF2-40B4-BE49-F238E27FC236}">
+                <a16:creationId xmlns:a16="http://schemas.microsoft.com/office/drawing/2014/main" id="{B81933D1-5615-42C7-9C0B-4EB7105CCE2D}"/>
+              </a:ext>
+              <a:ext uri="{C183D7F6-B498-43B3-948B-1728B52AA6E4}">
+                <adec:decorative xmlns:adec="http://schemas.microsoft.com/office/drawing/2017/decorative" val="1"/>
+              </a:ext>
+            </a:extLst>
+          </p:cNvPr>
+          <p:cNvSpPr>
+            <a:spLocks noGrp="1" noRot="1" noChangeAspect="1" noMove="1" noResize="1" noEditPoints="1" noAdjustHandles="1" noChangeArrowheads="1" noChangeShapeType="1" noTextEdit="1"/>
+          </p:cNvSpPr>
+          <p:nvPr>
+            <p:extLst>
+              <p:ext uri="{386F3935-93C4-4BCD-93E2-E3B085C9AB24}">
+                <p16:designElem xmlns:p16="http://schemas.microsoft.com/office/powerpoint/2015/main" val="1"/>
+              </p:ext>
+            </p:extLst>
+          </p:nvPr>
+        </p:nvSpPr>
+        <p:spPr>
+          <a:xfrm flipH="1">
+            <a:off x="10697670" y="0"/>
+            <a:ext cx="1494330" cy="6858000"/>
+          </a:xfrm>
+          <a:prstGeom prst="rect">
+            <a:avLst/>
+          </a:prstGeom>
+          <a:solidFill>
+            <a:schemeClr val="accent4"/>
+          </a:solidFill>
+          <a:ln>
+            <a:noFill/>
+          </a:ln>
+        </p:spPr>
+        <p:style>
+          <a:lnRef idx="2">
+            <a:schemeClr val="accent1">
+              <a:shade val="50000"/>
+            </a:schemeClr>
+          </a:lnRef>
+          <a:fillRef idx="1">
+            <a:schemeClr val="accent1"/>
+          </a:fillRef>
+          <a:effectRef idx="0">
+            <a:schemeClr val="accent1"/>
+          </a:effectRef>
+          <a:fontRef idx="minor">
+            <a:schemeClr val="lt1"/>
+          </a:fontRef>
+        </p:style>
+        <p:txBody>
+          <a:bodyPr rtlCol="0" anchor="ctr"/>
+          <a:lstStyle/>
+          <a:p>
+            <a:pPr algn="ctr"/>
+            <a:endParaRPr lang="en-US"/>
+          </a:p>
+        </p:txBody>
+      </p:sp>
+      <p:sp>
+        <p:nvSpPr>
+          <p:cNvPr id="1042" name="Rectangle 1041">
+            <a:extLst>
+              <a:ext uri="{FF2B5EF4-FFF2-40B4-BE49-F238E27FC236}">
+                <a16:creationId xmlns:a16="http://schemas.microsoft.com/office/drawing/2014/main" id="{19C9EAEA-39D0-4B0E-A0EB-51E7B26740B1}"/>
+              </a:ext>
+              <a:ext uri="{C183D7F6-B498-43B3-948B-1728B52AA6E4}">
+                <adec:decorative xmlns:adec="http://schemas.microsoft.com/office/drawing/2017/decorative" val="1"/>
+              </a:ext>
+            </a:extLst>
+          </p:cNvPr>
+          <p:cNvSpPr>
+            <a:spLocks noGrp="1" noRot="1" noChangeAspect="1" noMove="1" noResize="1" noEditPoints="1" noAdjustHandles="1" noChangeArrowheads="1" noChangeShapeType="1" noTextEdit="1"/>
+          </p:cNvSpPr>
+          <p:nvPr>
+            <p:extLst>
+              <p:ext uri="{386F3935-93C4-4BCD-93E2-E3B085C9AB24}">
+                <p16:designElem xmlns:p16="http://schemas.microsoft.com/office/powerpoint/2015/main" val="1"/>
+              </p:ext>
+            </p:extLst>
+          </p:nvPr>
+        </p:nvSpPr>
+        <p:spPr>
+          <a:xfrm>
+            <a:off x="5685810" y="391886"/>
+            <a:ext cx="6009366" cy="6017078"/>
+          </a:xfrm>
+          <a:prstGeom prst="rect">
+            <a:avLst/>
+          </a:prstGeom>
+          <a:solidFill>
+            <a:schemeClr val="bg1"/>
+          </a:solidFill>
+          <a:ln>
+            <a:noFill/>
+          </a:ln>
+          <a:effectLst>
+            <a:outerShdw blurRad="139700" dist="127000" dir="5400000" algn="t" rotWithShape="0">
+              <a:prstClr val="black">
+                <a:alpha val="15000"/>
+              </a:prstClr>
+            </a:outerShdw>
+          </a:effectLst>
+        </p:spPr>
+        <p:style>
+          <a:lnRef idx="2">
+            <a:schemeClr val="accent1">
+              <a:shade val="50000"/>
+            </a:schemeClr>
+          </a:lnRef>
+          <a:fillRef idx="1">
+            <a:schemeClr val="accent1"/>
+          </a:fillRef>
+          <a:effectRef idx="0">
+            <a:schemeClr val="accent1"/>
+          </a:effectRef>
+          <a:fontRef idx="minor">
+            <a:schemeClr val="lt1"/>
+          </a:fontRef>
+        </p:style>
+        <p:txBody>
+          <a:bodyPr rtlCol="0" anchor="ctr"/>
+          <a:lstStyle/>
+          <a:p>
+            <a:pPr algn="ctr"/>
+            <a:endParaRPr lang="en-US"/>
+          </a:p>
+        </p:txBody>
+      </p:sp>
+      <p:pic>
+        <p:nvPicPr>
+          <p:cNvPr id="1028" name="Picture 4" descr="GitHub - vaadin/vaadin-menu-bar: Web component for displaying a ...">
+            <a:extLst>
+              <a:ext uri="{FF2B5EF4-FFF2-40B4-BE49-F238E27FC236}">
+                <a16:creationId xmlns:a16="http://schemas.microsoft.com/office/drawing/2014/main" id="{7E992515-9DA1-8FBD-1105-044C55303E2C}"/>
+              </a:ext>
+            </a:extLst>
+          </p:cNvPr>
+          <p:cNvPicPr>
+            <a:picLocks noChangeAspect="1" noChangeArrowheads="1"/>
+          </p:cNvPicPr>
+          <p:nvPr/>
+        </p:nvPicPr>
+        <p:blipFill>
+          <a:blip r:embed="rId2">
+            <a:extLst>
+              <a:ext uri="{28A0092B-C50C-407E-A947-70E740481C1C}">
+                <a14:useLocalDpi xmlns:a14="http://schemas.microsoft.com/office/drawing/2010/main" val="0"/>
+              </a:ext>
+            </a:extLst>
+          </a:blip>
+          <a:stretch>
+            <a:fillRect/>
+          </a:stretch>
+        </p:blipFill>
+        <p:spPr bwMode="auto">
+          <a:xfrm>
+            <a:off x="5957597" y="666728"/>
+            <a:ext cx="5465791" cy="5465791"/>
+          </a:xfrm>
+          <a:prstGeom prst="rect">
+            <a:avLst/>
+          </a:prstGeom>
+          <a:noFill/>
+          <a:extLst>
+            <a:ext uri="{909E8E84-426E-40DD-AFC4-6F175D3DCCD1}">
+              <a14:hiddenFill xmlns:a14="http://schemas.microsoft.com/office/drawing/2010/main">
+                <a:solidFill>
+                  <a:srgbClr val="FFFFFF"/>
+                </a:solidFill>
+              </a14:hiddenFill>
+            </a:ext>
+          </a:extLst>
+        </p:spPr>
+      </p:pic>
       <p:sp>
         <p:nvSpPr>
           <p:cNvPr id="4" name="Datumsplatzhalter 3">
@@ -24752,16 +25756,45 @@
             <p:ph type="dt" sz="half" idx="10"/>
           </p:nvPr>
         </p:nvSpPr>
-        <p:spPr/>
+        <p:spPr>
+          <a:xfrm>
+            <a:off x="5922492" y="6492240"/>
+            <a:ext cx="2743200" cy="365125"/>
+          </a:xfrm>
+        </p:spPr>
         <p:txBody>
-          <a:bodyPr/>
+          <a:bodyPr vert="horz" lIns="91440" tIns="45720" rIns="91440" bIns="45720" rtlCol="0" anchor="ctr">
+            <a:normAutofit/>
+          </a:bodyPr>
           <a:lstStyle/>
           <a:p>
+            <a:pPr>
+              <a:spcAft>
+                <a:spcPts val="600"/>
+              </a:spcAft>
+            </a:pPr>
             <a:fld id="{684D5CCA-44DE-413B-B5C1-1D136BF17977}" type="datetime1">
-              <a:rPr lang="de-AT" smtClean="0"/>
-              <a:t>25.03.2025</a:t>
+              <a:rPr lang="en-US" smtClean="0">
+                <a:solidFill>
+                  <a:schemeClr val="tx1">
+                    <a:tint val="75000"/>
+                  </a:schemeClr>
+                </a:solidFill>
+              </a:rPr>
+              <a:pPr>
+                <a:spcAft>
+                  <a:spcPts val="600"/>
+                </a:spcAft>
+              </a:pPr>
+              <a:t>4/1/2025</a:t>
             </a:fld>
-            <a:endParaRPr lang="de-AT"/>
+            <a:endParaRPr lang="en-US">
+              <a:solidFill>
+                <a:schemeClr val="tx1">
+                  <a:tint val="75000"/>
+                </a:schemeClr>
+              </a:solidFill>
+            </a:endParaRPr>
           </a:p>
         </p:txBody>
       </p:sp>
@@ -24781,16 +25814,45 @@
             <p:ph type="sldNum" sz="quarter" idx="12"/>
           </p:nvPr>
         </p:nvSpPr>
-        <p:spPr/>
+        <p:spPr>
+          <a:xfrm>
+            <a:off x="8610600" y="6492240"/>
+            <a:ext cx="1871749" cy="365125"/>
+          </a:xfrm>
+        </p:spPr>
         <p:txBody>
-          <a:bodyPr/>
+          <a:bodyPr vert="horz" lIns="91440" tIns="45720" rIns="91440" bIns="45720" rtlCol="0" anchor="ctr">
+            <a:normAutofit/>
+          </a:bodyPr>
           <a:lstStyle/>
           <a:p>
+            <a:pPr>
+              <a:spcAft>
+                <a:spcPts val="600"/>
+              </a:spcAft>
+            </a:pPr>
             <a:fld id="{45EFCB84-3E55-4BB4-B142-FD608455239A}" type="slidenum">
-              <a:rPr lang="de-AT" smtClean="0"/>
+              <a:rPr lang="en-US" smtClean="0">
+                <a:solidFill>
+                  <a:schemeClr val="tx1">
+                    <a:tint val="75000"/>
+                  </a:schemeClr>
+                </a:solidFill>
+              </a:rPr>
+              <a:pPr>
+                <a:spcAft>
+                  <a:spcPts val="600"/>
+                </a:spcAft>
+              </a:pPr>
               <a:t>21</a:t>
             </a:fld>
-            <a:endParaRPr lang="de-AT"/>
+            <a:endParaRPr lang="en-US">
+              <a:solidFill>
+                <a:schemeClr val="tx1">
+                  <a:tint val="75000"/>
+                </a:schemeClr>
+              </a:solidFill>
+            </a:endParaRPr>
           </a:p>
         </p:txBody>
       </p:sp>
@@ -24804,6 +25866,9 @@
   <p:clrMapOvr>
     <a:masterClrMapping/>
   </p:clrMapOvr>
+  <p:transition spd="slow">
+    <p:push dir="u"/>
+  </p:transition>
 </p:sld>
 </file>
 
@@ -24919,7 +25984,7 @@
           <a:p>
             <a:fld id="{684D5CCA-44DE-413B-B5C1-1D136BF17977}" type="datetime1">
               <a:rPr lang="de-AT" smtClean="0"/>
-              <a:t>25.03.2025</a:t>
+              <a:t>01.04.2025</a:t>
             </a:fld>
             <a:endParaRPr lang="de-AT"/>
           </a:p>
@@ -24964,6 +26029,9 @@
   <p:clrMapOvr>
     <a:masterClrMapping/>
   </p:clrMapOvr>
+  <p:transition spd="slow">
+    <p:push dir="u"/>
+  </p:transition>
 </p:sld>
 </file>
 
@@ -25105,7 +26173,7 @@
           <a:p>
             <a:fld id="{684D5CCA-44DE-413B-B5C1-1D136BF17977}" type="datetime1">
               <a:rPr lang="de-AT" smtClean="0"/>
-              <a:t>25.03.2025</a:t>
+              <a:t>01.04.2025</a:t>
             </a:fld>
             <a:endParaRPr lang="de-AT"/>
           </a:p>
@@ -25150,6 +26218,9 @@
   <p:clrMapOvr>
     <a:masterClrMapping/>
   </p:clrMapOvr>
+  <p:transition spd="slow">
+    <p:push dir="u"/>
+  </p:transition>
 </p:sld>
 </file>
 
@@ -25236,8 +26307,11 @@
             </a:r>
             <a:r>
               <a:rPr lang="de-DE" dirty="0"/>
-              <a:t>  </a:t>
+              <a:t> </a:t>
             </a:r>
+          </a:p>
+          <a:p>
+            <a:endParaRPr lang="de-DE" dirty="0"/>
           </a:p>
         </p:txBody>
       </p:sp>
@@ -25264,7 +26338,7 @@
           <a:p>
             <a:fld id="{684D5CCA-44DE-413B-B5C1-1D136BF17977}" type="datetime1">
               <a:rPr lang="de-AT" smtClean="0"/>
-              <a:t>25.03.2025</a:t>
+              <a:t>01.04.2025</a:t>
             </a:fld>
             <a:endParaRPr lang="de-AT"/>
           </a:p>
@@ -25309,6 +26383,9 @@
   <p:clrMapOvr>
     <a:masterClrMapping/>
   </p:clrMapOvr>
+  <p:transition spd="slow">
+    <p:push dir="u"/>
+  </p:transition>
 </p:sld>
 </file>
 
@@ -25380,27 +26457,39 @@
           </a:bodyPr>
           <a:lstStyle/>
           <a:p>
+            <a:pPr marL="0" indent="0">
+              <a:buNone/>
+            </a:pPr>
             <a:r>
-              <a:rPr lang="de-AT" dirty="0"/>
+              <a:rPr lang="de-AT" b="1" dirty="0"/>
               <a:t>Kurze Definition</a:t>
             </a:r>
           </a:p>
           <a:p>
-            <a:pPr lvl="1"/>
+            <a:pPr lvl="1">
+              <a:buFont typeface="Symbol" panose="05050102010706020507" pitchFamily="18" charset="2"/>
+              <a:buChar char="-"/>
+            </a:pPr>
             <a:r>
               <a:rPr lang="de-AT" dirty="0"/>
               <a:t>Open-Source-Web-Framework für Java</a:t>
             </a:r>
           </a:p>
           <a:p>
-            <a:pPr lvl="1"/>
+            <a:pPr lvl="1">
+              <a:buFont typeface="Symbol" panose="05050102010706020507" pitchFamily="18" charset="2"/>
+              <a:buChar char="-"/>
+            </a:pPr>
             <a:r>
               <a:rPr lang="de-AT" dirty="0"/>
               <a:t>Erstellung moderner Web-Applikationen ohne tiefgehende Kenntnisse</a:t>
             </a:r>
           </a:p>
           <a:p>
-            <a:pPr lvl="1"/>
+            <a:pPr lvl="1">
+              <a:buFont typeface="Symbol" panose="05050102010706020507" pitchFamily="18" charset="2"/>
+              <a:buChar char="-"/>
+            </a:pPr>
             <a:r>
               <a:rPr lang="de-AT" dirty="0"/>
               <a:t>Server-Seitige Architektur – UI-Komponenten auf dem Server gerendert</a:t>
@@ -25411,21 +26500,24 @@
             <a:endParaRPr lang="de-AT" dirty="0"/>
           </a:p>
           <a:p>
-            <a:pPr marL="228600" lvl="1">
+            <a:pPr marL="0" lvl="1" indent="0">
               <a:spcBef>
                 <a:spcPts val="1000"/>
               </a:spcBef>
+              <a:buNone/>
             </a:pPr>
             <a:r>
-              <a:rPr lang="de-AT" sz="2800" dirty="0"/>
+              <a:rPr lang="de-AT" sz="2800" b="1" dirty="0"/>
               <a:t>Oberflächliche Einordnung &amp; Ziel</a:t>
             </a:r>
           </a:p>
           <a:p>
-            <a:pPr marL="685800" lvl="2">
+            <a:pPr marL="800100" lvl="2" indent="-342900">
               <a:spcBef>
                 <a:spcPts val="1000"/>
               </a:spcBef>
+              <a:buFont typeface="Symbol" panose="05050102010706020507" pitchFamily="18" charset="2"/>
+              <a:buChar char="-"/>
             </a:pPr>
             <a:r>
               <a:rPr lang="de-AT" sz="2400" dirty="0"/>
@@ -25433,10 +26525,12 @@
             </a:r>
           </a:p>
           <a:p>
-            <a:pPr marL="685800" lvl="2">
+            <a:pPr marL="800100" lvl="2" indent="-342900">
               <a:spcBef>
                 <a:spcPts val="1000"/>
               </a:spcBef>
+              <a:buFont typeface="Symbol" panose="05050102010706020507" pitchFamily="18" charset="2"/>
+              <a:buChar char="-"/>
             </a:pPr>
             <a:r>
               <a:rPr lang="de-AT" sz="2400" dirty="0"/>
@@ -25444,10 +26538,12 @@
             </a:r>
           </a:p>
           <a:p>
-            <a:pPr marL="685800" lvl="2">
+            <a:pPr marL="800100" lvl="2" indent="-342900">
               <a:spcBef>
                 <a:spcPts val="1000"/>
               </a:spcBef>
+              <a:buFont typeface="Symbol" panose="05050102010706020507" pitchFamily="18" charset="2"/>
+              <a:buChar char="-"/>
             </a:pPr>
             <a:r>
               <a:rPr lang="de-AT" sz="2400" dirty="0"/>
@@ -25487,7 +26583,7 @@
           <a:p>
             <a:fld id="{684D5CCA-44DE-413B-B5C1-1D136BF17977}" type="datetime1">
               <a:rPr lang="de-AT" smtClean="0"/>
-              <a:t>25.03.2025</a:t>
+              <a:t>01.04.2025</a:t>
             </a:fld>
             <a:endParaRPr lang="de-AT"/>
           </a:p>
@@ -25541,6 +26637,14 @@
 <file path=ppt/slides/slide4.xml><?xml version="1.0" encoding="utf-8"?>
 <p:sld xmlns:a="http://schemas.openxmlformats.org/drawingml/2006/main" xmlns:r="http://schemas.openxmlformats.org/officeDocument/2006/relationships" xmlns:p="http://schemas.openxmlformats.org/presentationml/2006/main">
   <p:cSld>
+    <p:bg>
+      <p:bgPr>
+        <a:solidFill>
+          <a:schemeClr val="bg1"/>
+        </a:solidFill>
+        <a:effectLst/>
+      </p:bgPr>
+    </p:bg>
     <p:spTree>
       <p:nvGrpSpPr>
         <p:cNvPr id="1" name=""/>
@@ -25555,6 +26659,66 @@
           <a:chExt cx="0" cy="0"/>
         </a:xfrm>
       </p:grpSpPr>
+      <p:sp useBgFill="1">
+        <p:nvSpPr>
+          <p:cNvPr id="12" name="Rectangle 11">
+            <a:extLst>
+              <a:ext uri="{FF2B5EF4-FFF2-40B4-BE49-F238E27FC236}">
+                <a16:creationId xmlns:a16="http://schemas.microsoft.com/office/drawing/2014/main" id="{943CAA20-3569-4189-9E48-239A229A86CA}"/>
+              </a:ext>
+              <a:ext uri="{C183D7F6-B498-43B3-948B-1728B52AA6E4}">
+                <adec:decorative xmlns:adec="http://schemas.microsoft.com/office/drawing/2017/decorative" val="1"/>
+              </a:ext>
+            </a:extLst>
+          </p:cNvPr>
+          <p:cNvSpPr>
+            <a:spLocks noGrp="1" noRot="1" noChangeAspect="1" noMove="1" noResize="1" noEditPoints="1" noAdjustHandles="1" noChangeArrowheads="1" noChangeShapeType="1" noTextEdit="1"/>
+          </p:cNvSpPr>
+          <p:nvPr>
+            <p:extLst>
+              <p:ext uri="{386F3935-93C4-4BCD-93E2-E3B085C9AB24}">
+                <p16:designElem xmlns:p16="http://schemas.microsoft.com/office/powerpoint/2015/main" val="1"/>
+              </p:ext>
+            </p:extLst>
+          </p:nvPr>
+        </p:nvSpPr>
+        <p:spPr>
+          <a:xfrm>
+            <a:off x="0" y="0"/>
+            <a:ext cx="12188952" cy="6858000"/>
+          </a:xfrm>
+          <a:prstGeom prst="rect">
+            <a:avLst/>
+          </a:prstGeom>
+          <a:ln>
+            <a:noFill/>
+          </a:ln>
+        </p:spPr>
+        <p:style>
+          <a:lnRef idx="2">
+            <a:schemeClr val="accent1">
+              <a:shade val="50000"/>
+            </a:schemeClr>
+          </a:lnRef>
+          <a:fillRef idx="1">
+            <a:schemeClr val="accent1"/>
+          </a:fillRef>
+          <a:effectRef idx="0">
+            <a:schemeClr val="accent1"/>
+          </a:effectRef>
+          <a:fontRef idx="minor">
+            <a:schemeClr val="lt1"/>
+          </a:fontRef>
+        </p:style>
+        <p:txBody>
+          <a:bodyPr rtlCol="0" anchor="ctr"/>
+          <a:lstStyle/>
+          <a:p>
+            <a:pPr algn="ctr"/>
+            <a:endParaRPr lang="en-US"/>
+          </a:p>
+        </p:txBody>
+      </p:sp>
       <p:sp>
         <p:nvSpPr>
           <p:cNvPr id="6" name="Titel 5">
@@ -25571,15 +26735,59 @@
             <p:ph type="title"/>
           </p:nvPr>
         </p:nvSpPr>
-        <p:spPr/>
+        <p:spPr>
+          <a:xfrm>
+            <a:off x="838200" y="451381"/>
+            <a:ext cx="10512552" cy="4066540"/>
+          </a:xfrm>
+        </p:spPr>
         <p:txBody>
-          <a:bodyPr/>
+          <a:bodyPr vert="horz" lIns="91440" tIns="45720" rIns="91440" bIns="45720" rtlCol="0" anchor="b">
+            <a:normAutofit/>
+          </a:bodyPr>
           <a:lstStyle/>
           <a:p>
             <a:r>
-              <a:rPr lang="de-AT" dirty="0"/>
-              <a:t>Grundwissen &amp; Theorie</a:t>
+              <a:rPr lang="en-US" sz="6600" kern="1200" dirty="0" err="1">
+                <a:solidFill>
+                  <a:schemeClr val="tx1"/>
+                </a:solidFill>
+                <a:latin typeface="+mj-lt"/>
+                <a:ea typeface="+mj-ea"/>
+                <a:cs typeface="+mj-cs"/>
+              </a:rPr>
+              <a:t>Grundwissen</a:t>
             </a:r>
+            <a:r>
+              <a:rPr lang="en-US" sz="6600" kern="1200" dirty="0">
+                <a:solidFill>
+                  <a:schemeClr val="tx1"/>
+                </a:solidFill>
+                <a:latin typeface="+mj-lt"/>
+                <a:ea typeface="+mj-ea"/>
+                <a:cs typeface="+mj-cs"/>
+              </a:rPr>
+              <a:t> &amp; </a:t>
+            </a:r>
+            <a:r>
+              <a:rPr lang="en-US" sz="6600" kern="1200" dirty="0" err="1">
+                <a:solidFill>
+                  <a:schemeClr val="tx1"/>
+                </a:solidFill>
+                <a:latin typeface="+mj-lt"/>
+                <a:ea typeface="+mj-ea"/>
+                <a:cs typeface="+mj-cs"/>
+              </a:rPr>
+              <a:t>Theorie</a:t>
+            </a:r>
+            <a:endParaRPr lang="en-US" sz="6600" kern="1200" dirty="0">
+              <a:solidFill>
+                <a:schemeClr val="tx1"/>
+              </a:solidFill>
+              <a:latin typeface="+mj-lt"/>
+              <a:ea typeface="+mj-ea"/>
+              <a:cs typeface="+mj-cs"/>
+            </a:endParaRPr>
           </a:p>
         </p:txBody>
       </p:sp>
@@ -25599,12 +26807,399 @@
             <p:ph type="body" idx="1"/>
           </p:nvPr>
         </p:nvSpPr>
-        <p:spPr/>
+        <p:spPr>
+          <a:xfrm>
+            <a:off x="838199" y="4983276"/>
+            <a:ext cx="10512552" cy="1126680"/>
+          </a:xfrm>
+        </p:spPr>
         <p:txBody>
-          <a:bodyPr/>
+          <a:bodyPr vert="horz" lIns="91440" tIns="45720" rIns="91440" bIns="45720" rtlCol="0">
+            <a:normAutofit/>
+          </a:bodyPr>
           <a:lstStyle/>
           <a:p>
-            <a:endParaRPr lang="de-AT"/>
+            <a:endParaRPr lang="en-US" sz="2400" kern="1200">
+              <a:solidFill>
+                <a:schemeClr val="tx1"/>
+              </a:solidFill>
+              <a:latin typeface="+mn-lt"/>
+              <a:ea typeface="+mn-ea"/>
+              <a:cs typeface="+mn-cs"/>
+            </a:endParaRPr>
+          </a:p>
+        </p:txBody>
+      </p:sp>
+      <p:sp>
+        <p:nvSpPr>
+          <p:cNvPr id="14" name="sketch line">
+            <a:extLst>
+              <a:ext uri="{FF2B5EF4-FFF2-40B4-BE49-F238E27FC236}">
+                <a16:creationId xmlns:a16="http://schemas.microsoft.com/office/drawing/2014/main" id="{DA542B6D-E775-4832-91DC-2D20F857813A}"/>
+              </a:ext>
+              <a:ext uri="{C183D7F6-B498-43B3-948B-1728B52AA6E4}">
+                <adec:decorative xmlns:adec="http://schemas.microsoft.com/office/drawing/2017/decorative" val="1"/>
+              </a:ext>
+            </a:extLst>
+          </p:cNvPr>
+          <p:cNvSpPr>
+            <a:spLocks noChangeAspect="1"/>
+          </p:cNvSpPr>
+          <p:nvPr>
+            <p:extLst>
+              <p:ext uri="{386F3935-93C4-4BCD-93E2-E3B085C9AB24}">
+                <p16:designElem xmlns:p16="http://schemas.microsoft.com/office/powerpoint/2015/main" val="1"/>
+              </p:ext>
+            </p:extLst>
+          </p:nvPr>
+        </p:nvSpPr>
+        <p:spPr>
+          <a:xfrm>
+            <a:off x="838200" y="4718595"/>
+            <a:ext cx="5410200" cy="18288"/>
+          </a:xfrm>
+          <a:custGeom>
+            <a:avLst/>
+            <a:gdLst>
+              <a:gd name="connsiteX0" fmla="*/ 0 w 5410200"/>
+              <a:gd name="connsiteY0" fmla="*/ 0 h 18288"/>
+              <a:gd name="connsiteX1" fmla="*/ 568071 w 5410200"/>
+              <a:gd name="connsiteY1" fmla="*/ 0 h 18288"/>
+              <a:gd name="connsiteX2" fmla="*/ 1298448 w 5410200"/>
+              <a:gd name="connsiteY2" fmla="*/ 0 h 18288"/>
+              <a:gd name="connsiteX3" fmla="*/ 1920621 w 5410200"/>
+              <a:gd name="connsiteY3" fmla="*/ 0 h 18288"/>
+              <a:gd name="connsiteX4" fmla="*/ 2488692 w 5410200"/>
+              <a:gd name="connsiteY4" fmla="*/ 0 h 18288"/>
+              <a:gd name="connsiteX5" fmla="*/ 3219069 w 5410200"/>
+              <a:gd name="connsiteY5" fmla="*/ 0 h 18288"/>
+              <a:gd name="connsiteX6" fmla="*/ 3895344 w 5410200"/>
+              <a:gd name="connsiteY6" fmla="*/ 0 h 18288"/>
+              <a:gd name="connsiteX7" fmla="*/ 4571619 w 5410200"/>
+              <a:gd name="connsiteY7" fmla="*/ 0 h 18288"/>
+              <a:gd name="connsiteX8" fmla="*/ 5410200 w 5410200"/>
+              <a:gd name="connsiteY8" fmla="*/ 0 h 18288"/>
+              <a:gd name="connsiteX9" fmla="*/ 5410200 w 5410200"/>
+              <a:gd name="connsiteY9" fmla="*/ 18288 h 18288"/>
+              <a:gd name="connsiteX10" fmla="*/ 4842129 w 5410200"/>
+              <a:gd name="connsiteY10" fmla="*/ 18288 h 18288"/>
+              <a:gd name="connsiteX11" fmla="*/ 4328160 w 5410200"/>
+              <a:gd name="connsiteY11" fmla="*/ 18288 h 18288"/>
+              <a:gd name="connsiteX12" fmla="*/ 3597783 w 5410200"/>
+              <a:gd name="connsiteY12" fmla="*/ 18288 h 18288"/>
+              <a:gd name="connsiteX13" fmla="*/ 3029712 w 5410200"/>
+              <a:gd name="connsiteY13" fmla="*/ 18288 h 18288"/>
+              <a:gd name="connsiteX14" fmla="*/ 2299335 w 5410200"/>
+              <a:gd name="connsiteY14" fmla="*/ 18288 h 18288"/>
+              <a:gd name="connsiteX15" fmla="*/ 1514856 w 5410200"/>
+              <a:gd name="connsiteY15" fmla="*/ 18288 h 18288"/>
+              <a:gd name="connsiteX16" fmla="*/ 892683 w 5410200"/>
+              <a:gd name="connsiteY16" fmla="*/ 18288 h 18288"/>
+              <a:gd name="connsiteX17" fmla="*/ 0 w 5410200"/>
+              <a:gd name="connsiteY17" fmla="*/ 18288 h 18288"/>
+              <a:gd name="connsiteX18" fmla="*/ 0 w 5410200"/>
+              <a:gd name="connsiteY18" fmla="*/ 0 h 18288"/>
+            </a:gdLst>
+            <a:ahLst/>
+            <a:cxnLst>
+              <a:cxn ang="0">
+                <a:pos x="connsiteX0" y="connsiteY0"/>
+              </a:cxn>
+              <a:cxn ang="0">
+                <a:pos x="connsiteX1" y="connsiteY1"/>
+              </a:cxn>
+              <a:cxn ang="0">
+                <a:pos x="connsiteX2" y="connsiteY2"/>
+              </a:cxn>
+              <a:cxn ang="0">
+                <a:pos x="connsiteX3" y="connsiteY3"/>
+              </a:cxn>
+              <a:cxn ang="0">
+                <a:pos x="connsiteX4" y="connsiteY4"/>
+              </a:cxn>
+              <a:cxn ang="0">
+                <a:pos x="connsiteX5" y="connsiteY5"/>
+              </a:cxn>
+              <a:cxn ang="0">
+                <a:pos x="connsiteX6" y="connsiteY6"/>
+              </a:cxn>
+              <a:cxn ang="0">
+                <a:pos x="connsiteX7" y="connsiteY7"/>
+              </a:cxn>
+              <a:cxn ang="0">
+                <a:pos x="connsiteX8" y="connsiteY8"/>
+              </a:cxn>
+              <a:cxn ang="0">
+                <a:pos x="connsiteX9" y="connsiteY9"/>
+              </a:cxn>
+              <a:cxn ang="0">
+                <a:pos x="connsiteX10" y="connsiteY10"/>
+              </a:cxn>
+              <a:cxn ang="0">
+                <a:pos x="connsiteX11" y="connsiteY11"/>
+              </a:cxn>
+              <a:cxn ang="0">
+                <a:pos x="connsiteX12" y="connsiteY12"/>
+              </a:cxn>
+              <a:cxn ang="0">
+                <a:pos x="connsiteX13" y="connsiteY13"/>
+              </a:cxn>
+              <a:cxn ang="0">
+                <a:pos x="connsiteX14" y="connsiteY14"/>
+              </a:cxn>
+              <a:cxn ang="0">
+                <a:pos x="connsiteX15" y="connsiteY15"/>
+              </a:cxn>
+              <a:cxn ang="0">
+                <a:pos x="connsiteX16" y="connsiteY16"/>
+              </a:cxn>
+              <a:cxn ang="0">
+                <a:pos x="connsiteX17" y="connsiteY17"/>
+              </a:cxn>
+              <a:cxn ang="0">
+                <a:pos x="connsiteX18" y="connsiteY18"/>
+              </a:cxn>
+            </a:cxnLst>
+            <a:rect l="l" t="t" r="r" b="b"/>
+            <a:pathLst>
+              <a:path w="5410200" h="18288" fill="none" extrusionOk="0">
+                <a:moveTo>
+                  <a:pt x="0" y="0"/>
+                </a:moveTo>
+                <a:cubicBezTo>
+                  <a:pt x="163050" y="-18707"/>
+                  <a:pt x="319321" y="-16364"/>
+                  <a:pt x="568071" y="0"/>
+                </a:cubicBezTo>
+                <a:cubicBezTo>
+                  <a:pt x="816821" y="16364"/>
+                  <a:pt x="1013224" y="-7268"/>
+                  <a:pt x="1298448" y="0"/>
+                </a:cubicBezTo>
+                <a:cubicBezTo>
+                  <a:pt x="1583672" y="7268"/>
+                  <a:pt x="1631711" y="-3367"/>
+                  <a:pt x="1920621" y="0"/>
+                </a:cubicBezTo>
+                <a:cubicBezTo>
+                  <a:pt x="2209531" y="3367"/>
+                  <a:pt x="2364420" y="-19184"/>
+                  <a:pt x="2488692" y="0"/>
+                </a:cubicBezTo>
+                <a:cubicBezTo>
+                  <a:pt x="2612964" y="19184"/>
+                  <a:pt x="3023298" y="-34627"/>
+                  <a:pt x="3219069" y="0"/>
+                </a:cubicBezTo>
+                <a:cubicBezTo>
+                  <a:pt x="3414840" y="34627"/>
+                  <a:pt x="3656810" y="24043"/>
+                  <a:pt x="3895344" y="0"/>
+                </a:cubicBezTo>
+                <a:cubicBezTo>
+                  <a:pt x="4133879" y="-24043"/>
+                  <a:pt x="4393984" y="-19577"/>
+                  <a:pt x="4571619" y="0"/>
+                </a:cubicBezTo>
+                <a:cubicBezTo>
+                  <a:pt x="4749255" y="19577"/>
+                  <a:pt x="5179928" y="-6281"/>
+                  <a:pt x="5410200" y="0"/>
+                </a:cubicBezTo>
+                <a:cubicBezTo>
+                  <a:pt x="5410730" y="6954"/>
+                  <a:pt x="5410934" y="12839"/>
+                  <a:pt x="5410200" y="18288"/>
+                </a:cubicBezTo>
+                <a:cubicBezTo>
+                  <a:pt x="5139060" y="6751"/>
+                  <a:pt x="5121593" y="31035"/>
+                  <a:pt x="4842129" y="18288"/>
+                </a:cubicBezTo>
+                <a:cubicBezTo>
+                  <a:pt x="4562665" y="5541"/>
+                  <a:pt x="4448273" y="9487"/>
+                  <a:pt x="4328160" y="18288"/>
+                </a:cubicBezTo>
+                <a:cubicBezTo>
+                  <a:pt x="4208047" y="27089"/>
+                  <a:pt x="3760936" y="22567"/>
+                  <a:pt x="3597783" y="18288"/>
+                </a:cubicBezTo>
+                <a:cubicBezTo>
+                  <a:pt x="3434630" y="14009"/>
+                  <a:pt x="3299718" y="33213"/>
+                  <a:pt x="3029712" y="18288"/>
+                </a:cubicBezTo>
+                <a:cubicBezTo>
+                  <a:pt x="2759706" y="3363"/>
+                  <a:pt x="2640159" y="27394"/>
+                  <a:pt x="2299335" y="18288"/>
+                </a:cubicBezTo>
+                <a:cubicBezTo>
+                  <a:pt x="1958511" y="9182"/>
+                  <a:pt x="1801186" y="28985"/>
+                  <a:pt x="1514856" y="18288"/>
+                </a:cubicBezTo>
+                <a:cubicBezTo>
+                  <a:pt x="1228526" y="7591"/>
+                  <a:pt x="1063509" y="-5305"/>
+                  <a:pt x="892683" y="18288"/>
+                </a:cubicBezTo>
+                <a:cubicBezTo>
+                  <a:pt x="721857" y="41881"/>
+                  <a:pt x="186945" y="-20897"/>
+                  <a:pt x="0" y="18288"/>
+                </a:cubicBezTo>
+                <a:cubicBezTo>
+                  <a:pt x="-570" y="9279"/>
+                  <a:pt x="132" y="5100"/>
+                  <a:pt x="0" y="0"/>
+                </a:cubicBezTo>
+                <a:close/>
+              </a:path>
+              <a:path w="5410200" h="18288" stroke="0" extrusionOk="0">
+                <a:moveTo>
+                  <a:pt x="0" y="0"/>
+                </a:moveTo>
+                <a:cubicBezTo>
+                  <a:pt x="285096" y="-4925"/>
+                  <a:pt x="376456" y="22268"/>
+                  <a:pt x="622173" y="0"/>
+                </a:cubicBezTo>
+                <a:cubicBezTo>
+                  <a:pt x="867890" y="-22268"/>
+                  <a:pt x="1031392" y="7228"/>
+                  <a:pt x="1136142" y="0"/>
+                </a:cubicBezTo>
+                <a:cubicBezTo>
+                  <a:pt x="1240892" y="-7228"/>
+                  <a:pt x="1561853" y="9877"/>
+                  <a:pt x="1920621" y="0"/>
+                </a:cubicBezTo>
+                <a:cubicBezTo>
+                  <a:pt x="2279389" y="-9877"/>
+                  <a:pt x="2367255" y="19546"/>
+                  <a:pt x="2542794" y="0"/>
+                </a:cubicBezTo>
+                <a:cubicBezTo>
+                  <a:pt x="2718333" y="-19546"/>
+                  <a:pt x="2866732" y="-22226"/>
+                  <a:pt x="3164967" y="0"/>
+                </a:cubicBezTo>
+                <a:cubicBezTo>
+                  <a:pt x="3463202" y="22226"/>
+                  <a:pt x="3568055" y="-2765"/>
+                  <a:pt x="3949446" y="0"/>
+                </a:cubicBezTo>
+                <a:cubicBezTo>
+                  <a:pt x="4330837" y="2765"/>
+                  <a:pt x="4287895" y="10557"/>
+                  <a:pt x="4517517" y="0"/>
+                </a:cubicBezTo>
+                <a:cubicBezTo>
+                  <a:pt x="4747139" y="-10557"/>
+                  <a:pt x="5149588" y="8716"/>
+                  <a:pt x="5410200" y="0"/>
+                </a:cubicBezTo>
+                <a:cubicBezTo>
+                  <a:pt x="5409517" y="5414"/>
+                  <a:pt x="5409480" y="12510"/>
+                  <a:pt x="5410200" y="18288"/>
+                </a:cubicBezTo>
+                <a:cubicBezTo>
+                  <a:pt x="5163327" y="41494"/>
+                  <a:pt x="5008749" y="10693"/>
+                  <a:pt x="4842129" y="18288"/>
+                </a:cubicBezTo>
+                <a:cubicBezTo>
+                  <a:pt x="4675509" y="25883"/>
+                  <a:pt x="4433401" y="-615"/>
+                  <a:pt x="4165854" y="18288"/>
+                </a:cubicBezTo>
+                <a:cubicBezTo>
+                  <a:pt x="3898308" y="37191"/>
+                  <a:pt x="3809032" y="-8710"/>
+                  <a:pt x="3543681" y="18288"/>
+                </a:cubicBezTo>
+                <a:cubicBezTo>
+                  <a:pt x="3278330" y="45286"/>
+                  <a:pt x="3073876" y="-15917"/>
+                  <a:pt x="2759202" y="18288"/>
+                </a:cubicBezTo>
+                <a:cubicBezTo>
+                  <a:pt x="2444528" y="52493"/>
+                  <a:pt x="2204144" y="3372"/>
+                  <a:pt x="1974723" y="18288"/>
+                </a:cubicBezTo>
+                <a:cubicBezTo>
+                  <a:pt x="1745302" y="33204"/>
+                  <a:pt x="1602335" y="31490"/>
+                  <a:pt x="1406652" y="18288"/>
+                </a:cubicBezTo>
+                <a:cubicBezTo>
+                  <a:pt x="1210969" y="5086"/>
+                  <a:pt x="923948" y="3161"/>
+                  <a:pt x="730377" y="18288"/>
+                </a:cubicBezTo>
+                <a:cubicBezTo>
+                  <a:pt x="536806" y="33415"/>
+                  <a:pt x="336496" y="-141"/>
+                  <a:pt x="0" y="18288"/>
+                </a:cubicBezTo>
+                <a:cubicBezTo>
+                  <a:pt x="-306" y="11061"/>
+                  <a:pt x="-655" y="7751"/>
+                  <a:pt x="0" y="0"/>
+                </a:cubicBezTo>
+                <a:close/>
+              </a:path>
+            </a:pathLst>
+          </a:custGeom>
+          <a:solidFill>
+            <a:srgbClr val="0F9ED5"/>
+          </a:solidFill>
+          <a:ln w="41275" cap="rnd">
+            <a:solidFill>
+              <a:srgbClr val="0F9ED5"/>
+            </a:solidFill>
+            <a:round/>
+            <a:extLst>
+              <a:ext uri="{C807C97D-BFC1-408E-A445-0C87EB9F89A2}">
+                <ask:lineSketchStyleProps xmlns:ask="http://schemas.microsoft.com/office/drawing/2018/sketchyshapes" sd="1219033472">
+                  <a:prstGeom prst="rect">
+                    <a:avLst/>
+                  </a:prstGeom>
+                  <ask:type>
+                    <ask:lineSketchFreehand/>
+                  </ask:type>
+                </ask:lineSketchStyleProps>
+              </a:ext>
+            </a:extLst>
+          </a:ln>
+        </p:spPr>
+        <p:style>
+          <a:lnRef idx="2">
+            <a:schemeClr val="accent1">
+              <a:shade val="50000"/>
+            </a:schemeClr>
+          </a:lnRef>
+          <a:fillRef idx="1">
+            <a:schemeClr val="accent1"/>
+          </a:fillRef>
+          <a:effectRef idx="0">
+            <a:schemeClr val="accent1"/>
+          </a:effectRef>
+          <a:fontRef idx="minor">
+            <a:schemeClr val="lt1"/>
+          </a:fontRef>
+        </p:style>
+        <p:txBody>
+          <a:bodyPr rtlCol="0" anchor="ctr"/>
+          <a:lstStyle/>
+          <a:p>
+            <a:pPr algn="ctr"/>
+            <a:endParaRPr lang="en-US"/>
           </a:p>
         </p:txBody>
       </p:sp>
@@ -25624,16 +27219,45 @@
             <p:ph type="dt" sz="half" idx="10"/>
           </p:nvPr>
         </p:nvSpPr>
-        <p:spPr/>
+        <p:spPr>
+          <a:xfrm>
+            <a:off x="838200" y="6356350"/>
+            <a:ext cx="2743200" cy="365125"/>
+          </a:xfrm>
+        </p:spPr>
         <p:txBody>
-          <a:bodyPr/>
+          <a:bodyPr vert="horz" lIns="91440" tIns="45720" rIns="91440" bIns="45720" rtlCol="0" anchor="ctr">
+            <a:normAutofit/>
+          </a:bodyPr>
           <a:lstStyle/>
           <a:p>
+            <a:pPr>
+              <a:spcAft>
+                <a:spcPts val="600"/>
+              </a:spcAft>
+            </a:pPr>
             <a:fld id="{684D5CCA-44DE-413B-B5C1-1D136BF17977}" type="datetime1">
-              <a:rPr lang="de-AT" smtClean="0"/>
-              <a:t>25.03.2025</a:t>
+              <a:rPr lang="en-US" smtClean="0">
+                <a:solidFill>
+                  <a:schemeClr val="tx1">
+                    <a:tint val="75000"/>
+                  </a:schemeClr>
+                </a:solidFill>
+              </a:rPr>
+              <a:pPr>
+                <a:spcAft>
+                  <a:spcPts val="600"/>
+                </a:spcAft>
+              </a:pPr>
+              <a:t>4/1/2025</a:t>
             </a:fld>
-            <a:endParaRPr lang="de-AT"/>
+            <a:endParaRPr lang="en-US">
+              <a:solidFill>
+                <a:schemeClr val="tx1">
+                  <a:tint val="75000"/>
+                </a:schemeClr>
+              </a:solidFill>
+            </a:endParaRPr>
           </a:p>
         </p:txBody>
       </p:sp>
@@ -25653,16 +27277,45 @@
             <p:ph type="sldNum" sz="quarter" idx="12"/>
           </p:nvPr>
         </p:nvSpPr>
-        <p:spPr/>
+        <p:spPr>
+          <a:xfrm>
+            <a:off x="8610600" y="6356350"/>
+            <a:ext cx="2743200" cy="365125"/>
+          </a:xfrm>
+        </p:spPr>
         <p:txBody>
-          <a:bodyPr/>
+          <a:bodyPr vert="horz" lIns="91440" tIns="45720" rIns="91440" bIns="45720" rtlCol="0" anchor="ctr">
+            <a:normAutofit/>
+          </a:bodyPr>
           <a:lstStyle/>
           <a:p>
+            <a:pPr>
+              <a:spcAft>
+                <a:spcPts val="600"/>
+              </a:spcAft>
+            </a:pPr>
             <a:fld id="{45EFCB84-3E55-4BB4-B142-FD608455239A}" type="slidenum">
-              <a:rPr lang="de-AT" smtClean="0"/>
+              <a:rPr lang="en-US" smtClean="0">
+                <a:solidFill>
+                  <a:schemeClr val="tx1">
+                    <a:tint val="75000"/>
+                  </a:schemeClr>
+                </a:solidFill>
+              </a:rPr>
+              <a:pPr>
+                <a:spcAft>
+                  <a:spcPts val="600"/>
+                </a:spcAft>
+              </a:pPr>
               <a:t>4</a:t>
             </a:fld>
-            <a:endParaRPr lang="de-AT"/>
+            <a:endParaRPr lang="en-US">
+              <a:solidFill>
+                <a:schemeClr val="tx1">
+                  <a:tint val="75000"/>
+                </a:schemeClr>
+              </a:solidFill>
+            </a:endParaRPr>
           </a:p>
         </p:txBody>
       </p:sp>
@@ -25792,7 +27445,7 @@
           <a:p>
             <a:fld id="{684D5CCA-44DE-413B-B5C1-1D136BF17977}" type="datetime1">
               <a:rPr lang="de-AT" smtClean="0"/>
-              <a:t>25.03.2025</a:t>
+              <a:t>01.04.2025</a:t>
             </a:fld>
             <a:endParaRPr lang="de-AT"/>
           </a:p>
@@ -26026,7 +27679,7 @@
           <a:p>
             <a:fld id="{684D5CCA-44DE-413B-B5C1-1D136BF17977}" type="datetime1">
               <a:rPr lang="de-AT" smtClean="0"/>
-              <a:t>25.03.2025</a:t>
+              <a:t>01.04.2025</a:t>
             </a:fld>
             <a:endParaRPr lang="de-AT"/>
           </a:p>
@@ -26144,13 +27797,13 @@
   <p:clrMapOvr>
     <a:masterClrMapping/>
   </p:clrMapOvr>
-  <mc:AlternateContent xmlns:mc="http://schemas.openxmlformats.org/markup-compatibility/2006">
-    <mc:Choice xmlns:p159="http://schemas.microsoft.com/office/powerpoint/2015/09/main" Requires="p159">
+  <mc:AlternateContent xmlns:mc="http://schemas.openxmlformats.org/markup-compatibility/2006" xmlns:p159="http://schemas.microsoft.com/office/powerpoint/2015/09/main">
+    <mc:Choice Requires="p159">
       <p:transition xmlns:p14="http://schemas.microsoft.com/office/powerpoint/2010/main" spd="slow" p14:dur="2000">
         <p159:morph option="byObject"/>
       </p:transition>
     </mc:Choice>
-    <mc:Fallback>
+    <mc:Fallback xmlns="">
       <p:transition spd="slow">
         <p:fade/>
       </p:transition>
@@ -26269,7 +27922,7 @@
           <a:p>
             <a:fld id="{684D5CCA-44DE-413B-B5C1-1D136BF17977}" type="datetime1">
               <a:rPr lang="de-AT" smtClean="0"/>
-              <a:t>25.03.2025</a:t>
+              <a:t>01.04.2025</a:t>
             </a:fld>
             <a:endParaRPr lang="de-AT"/>
           </a:p>
@@ -26387,13 +28040,13 @@
   <p:clrMapOvr>
     <a:masterClrMapping/>
   </p:clrMapOvr>
-  <mc:AlternateContent xmlns:mc="http://schemas.openxmlformats.org/markup-compatibility/2006">
-    <mc:Choice xmlns:p159="http://schemas.microsoft.com/office/powerpoint/2015/09/main" Requires="p159">
+  <mc:AlternateContent xmlns:mc="http://schemas.openxmlformats.org/markup-compatibility/2006" xmlns:p159="http://schemas.microsoft.com/office/powerpoint/2015/09/main">
+    <mc:Choice Requires="p159">
       <p:transition xmlns:p14="http://schemas.microsoft.com/office/powerpoint/2010/main" spd="slow" p14:dur="2000">
         <p159:morph option="byObject"/>
       </p:transition>
     </mc:Choice>
-    <mc:Fallback>
+    <mc:Fallback xmlns="">
       <p:transition spd="slow">
         <p:fade/>
       </p:transition>
@@ -26512,7 +28165,7 @@
           <a:p>
             <a:fld id="{684D5CCA-44DE-413B-B5C1-1D136BF17977}" type="datetime1">
               <a:rPr lang="de-AT" smtClean="0"/>
-              <a:t>25.03.2025</a:t>
+              <a:t>01.04.2025</a:t>
             </a:fld>
             <a:endParaRPr lang="de-AT"/>
           </a:p>
@@ -26630,13 +28283,13 @@
   <p:clrMapOvr>
     <a:masterClrMapping/>
   </p:clrMapOvr>
-  <mc:AlternateContent xmlns:mc="http://schemas.openxmlformats.org/markup-compatibility/2006">
-    <mc:Choice xmlns:p159="http://schemas.microsoft.com/office/powerpoint/2015/09/main" Requires="p159">
+  <mc:AlternateContent xmlns:mc="http://schemas.openxmlformats.org/markup-compatibility/2006" xmlns:p159="http://schemas.microsoft.com/office/powerpoint/2015/09/main">
+    <mc:Choice Requires="p159">
       <p:transition xmlns:p14="http://schemas.microsoft.com/office/powerpoint/2010/main" spd="slow" p14:dur="2000">
         <p159:morph option="byObject"/>
       </p:transition>
     </mc:Choice>
-    <mc:Fallback>
+    <mc:Fallback xmlns="">
       <p:transition spd="slow">
         <p:fade/>
       </p:transition>
@@ -26755,7 +28408,7 @@
           <a:p>
             <a:fld id="{684D5CCA-44DE-413B-B5C1-1D136BF17977}" type="datetime1">
               <a:rPr lang="de-AT" smtClean="0"/>
-              <a:t>25.03.2025</a:t>
+              <a:t>01.04.2025</a:t>
             </a:fld>
             <a:endParaRPr lang="de-AT"/>
           </a:p>
@@ -26873,13 +28526,13 @@
   <p:clrMapOvr>
     <a:masterClrMapping/>
   </p:clrMapOvr>
-  <mc:AlternateContent xmlns:mc="http://schemas.openxmlformats.org/markup-compatibility/2006">
-    <mc:Choice xmlns:p159="http://schemas.microsoft.com/office/powerpoint/2015/09/main" Requires="p159">
+  <mc:AlternateContent xmlns:mc="http://schemas.openxmlformats.org/markup-compatibility/2006" xmlns:p159="http://schemas.microsoft.com/office/powerpoint/2015/09/main">
+    <mc:Choice Requires="p159">
       <p:transition xmlns:p14="http://schemas.microsoft.com/office/powerpoint/2010/main" spd="slow" p14:dur="2000">
         <p159:morph option="byObject"/>
       </p:transition>
     </mc:Choice>
-    <mc:Fallback>
+    <mc:Fallback xmlns="">
       <p:transition spd="slow">
         <p:fade/>
       </p:transition>

</xml_diff>